<commit_message>
final cassandra PPT, and other minor cleanups
</commit_message>
<xml_diff>
--- a/cassandra-training.pptx
+++ b/cassandra-training.pptx
@@ -5,7 +5,7 @@
     <p:sldMasterId id="2147483744" r:id="rId1"/>
   </p:sldMasterIdLst>
   <p:notesMasterIdLst>
-    <p:notesMasterId r:id="rId27"/>
+    <p:notesMasterId r:id="rId32"/>
   </p:notesMasterIdLst>
   <p:sldIdLst>
     <p:sldId id="256" r:id="rId2"/>
@@ -29,10 +29,15 @@
     <p:sldId id="288" r:id="rId20"/>
     <p:sldId id="277" r:id="rId21"/>
     <p:sldId id="281" r:id="rId22"/>
-    <p:sldId id="280" r:id="rId23"/>
-    <p:sldId id="282" r:id="rId24"/>
-    <p:sldId id="283" r:id="rId25"/>
-    <p:sldId id="278" r:id="rId26"/>
+    <p:sldId id="289" r:id="rId23"/>
+    <p:sldId id="280" r:id="rId24"/>
+    <p:sldId id="282" r:id="rId25"/>
+    <p:sldId id="283" r:id="rId26"/>
+    <p:sldId id="290" r:id="rId27"/>
+    <p:sldId id="291" r:id="rId28"/>
+    <p:sldId id="292" r:id="rId29"/>
+    <p:sldId id="293" r:id="rId30"/>
+    <p:sldId id="278" r:id="rId31"/>
   </p:sldIdLst>
   <p:sldSz cx="9144000" cy="6858000" type="screen4x3"/>
   <p:notesSz cx="7077075" cy="9363075"/>
@@ -234,8 +239,8 @@
         </p:nvSpPr>
         <p:spPr>
           <a:xfrm>
-            <a:off x="1196975" y="701675"/>
-            <a:ext cx="4683125" cy="3511550"/>
+            <a:off x="1198563" y="701675"/>
+            <a:ext cx="4679950" cy="3511550"/>
           </a:xfrm>
           <a:prstGeom prst="rect">
             <a:avLst/>
@@ -511,7 +516,12 @@
             <p:ph type="sldImg"/>
           </p:nvPr>
         </p:nvSpPr>
-        <p:spPr/>
+        <p:spPr>
+          <a:xfrm>
+            <a:off x="1198563" y="701675"/>
+            <a:ext cx="4679950" cy="3511550"/>
+          </a:xfrm>
+        </p:spPr>
       </p:sp>
       <p:sp>
         <p:nvSpPr>
@@ -528,28 +538,10 @@
           <a:bodyPr/>
           <a:lstStyle/>
           <a:p>
-            <a:pPr marL="171450" indent="-171450">
+            <a:pPr marL="0" indent="0">
               <a:buFont typeface="Arial" panose="020B0604020202020204" pitchFamily="34" charset="0"/>
-              <a:buChar char="•"/>
+              <a:buNone/>
             </a:pPr>
-            <a:r>
-              <a:rPr lang="en-US" dirty="0" smtClean="0"/>
-              <a:t>How</a:t>
-            </a:r>
-            <a:r>
-              <a:rPr lang="en-US" baseline="0" dirty="0" smtClean="0"/>
-              <a:t> do we increase a post’s vote and express it here in this CF?</a:t>
-            </a:r>
-          </a:p>
-          <a:p>
-            <a:pPr marL="171450" indent="-171450">
-              <a:buFont typeface="Arial" panose="020B0604020202020204" pitchFamily="34" charset="0"/>
-              <a:buChar char="•"/>
-            </a:pPr>
-            <a:r>
-              <a:rPr lang="en-US" baseline="0" dirty="0" smtClean="0"/>
-              <a:t>Is it a good idea to use a single row?  What if we have a 100 node cluster – how many nodes are used to service this row?</a:t>
-            </a:r>
             <a:endParaRPr lang="en-US" dirty="0"/>
           </a:p>
         </p:txBody>
@@ -571,7 +563,7 @@
           <a:p>
             <a:fld id="{B887A0D3-B9DA-4347-934E-8C6942BC9D7C}" type="slidenum">
               <a:rPr lang="en-US" smtClean="0"/>
-              <a:t>22</a:t>
+              <a:t>23</a:t>
             </a:fld>
             <a:endParaRPr lang="en-US"/>
           </a:p>
@@ -4360,7 +4352,7 @@
         </p:nvSpPr>
         <p:spPr>
           <a:xfrm>
-            <a:off x="6629400" y="1447800"/>
+            <a:off x="6629400" y="1447801"/>
             <a:ext cx="2057400" cy="4487333"/>
           </a:xfrm>
         </p:spPr>
@@ -4735,7 +4727,7 @@
         </p:nvSpPr>
         <p:spPr bwMode="hidden">
           <a:xfrm>
-            <a:off x="6047438" y="4203592"/>
+            <a:off x="6047439" y="4203592"/>
             <a:ext cx="2876429" cy="714026"/>
           </a:xfrm>
           <a:custGeom>
@@ -5504,7 +5496,7 @@
         </p:nvSpPr>
         <p:spPr bwMode="hidden">
           <a:xfrm>
-            <a:off x="2828728" y="4087562"/>
+            <a:off x="2828729" y="4087563"/>
             <a:ext cx="5467980" cy="774272"/>
           </a:xfrm>
           <a:custGeom>
@@ -5738,7 +5730,7 @@
         </p:nvSpPr>
         <p:spPr bwMode="hidden">
           <a:xfrm>
-            <a:off x="5609489" y="4074174"/>
+            <a:off x="5609489" y="4074175"/>
             <a:ext cx="3308000" cy="651549"/>
           </a:xfrm>
           <a:custGeom>
@@ -5906,7 +5898,7 @@
         </p:nvSpPr>
         <p:spPr bwMode="hidden">
           <a:xfrm>
-            <a:off x="211665" y="4058555"/>
+            <a:off x="211665" y="4058556"/>
             <a:ext cx="8723376" cy="1329874"/>
           </a:xfrm>
           <a:custGeom>
@@ -6314,8 +6306,8 @@
         </p:nvSpPr>
         <p:spPr>
           <a:xfrm>
-            <a:off x="1367365" y="1437448"/>
-            <a:ext cx="6417734" cy="939801"/>
+            <a:off x="1367366" y="1437449"/>
+            <a:ext cx="6417735" cy="939801"/>
           </a:xfrm>
         </p:spPr>
         <p:txBody>
@@ -6851,7 +6843,7 @@
         </p:nvSpPr>
         <p:spPr>
           <a:xfrm>
-            <a:off x="677332" y="3429000"/>
+            <a:off x="677334" y="3429001"/>
             <a:ext cx="3820055" cy="2697163"/>
           </a:xfrm>
         </p:spPr>
@@ -7006,7 +6998,7 @@
         </p:nvSpPr>
         <p:spPr>
           <a:xfrm>
-            <a:off x="4645025" y="3429000"/>
+            <a:off x="4645025" y="3429001"/>
             <a:ext cx="3822192" cy="2697163"/>
           </a:xfrm>
         </p:spPr>
@@ -7357,7 +7349,7 @@
         </p:nvGrpSpPr>
         <p:grpSpPr bwMode="hidden">
           <a:xfrm>
-            <a:off x="211665" y="714191"/>
+            <a:off x="211665" y="714192"/>
             <a:ext cx="8723376" cy="1329874"/>
             <a:chOff x="-3905251" y="4294188"/>
             <a:chExt cx="13027839" cy="1892300"/>
@@ -9139,7 +9131,7 @@
         </p:nvSpPr>
         <p:spPr>
           <a:xfrm>
-            <a:off x="914400" y="3581400"/>
+            <a:off x="914400" y="3581401"/>
             <a:ext cx="3352800" cy="1905001"/>
           </a:xfrm>
         </p:spPr>
@@ -10814,7 +10806,7 @@
         </p:nvSpPr>
         <p:spPr>
           <a:xfrm>
-            <a:off x="4651962" y="1828800"/>
+            <a:off x="4651963" y="1828800"/>
             <a:ext cx="3904076" cy="3810000"/>
           </a:xfrm>
         </p:spPr>
@@ -12580,7 +12572,7 @@
         </p:nvSpPr>
         <p:spPr>
           <a:xfrm>
-            <a:off x="4874155" y="338667"/>
+            <a:off x="4874156" y="338667"/>
             <a:ext cx="3812645" cy="2429934"/>
           </a:xfrm>
         </p:spPr>
@@ -12618,7 +12610,7 @@
         </p:nvSpPr>
         <p:spPr>
           <a:xfrm>
-            <a:off x="4868333" y="2785533"/>
+            <a:off x="4868333" y="2785534"/>
             <a:ext cx="3818467" cy="2421467"/>
           </a:xfrm>
         </p:spPr>
@@ -12939,7 +12931,7 @@
         </p:nvGrpSpPr>
         <p:grpSpPr bwMode="hidden">
           <a:xfrm>
-            <a:off x="211665" y="1679429"/>
+            <a:off x="211665" y="1679430"/>
             <a:ext cx="8723376" cy="1329874"/>
             <a:chOff x="-3905251" y="4294188"/>
             <a:chExt cx="13027839" cy="1892300"/>
@@ -14534,8 +14526,8 @@
         </p:nvSpPr>
         <p:spPr>
           <a:xfrm>
-            <a:off x="5163672" y="6250164"/>
-            <a:ext cx="3786690" cy="365125"/>
+            <a:off x="5163672" y="6250165"/>
+            <a:ext cx="3786691" cy="365125"/>
           </a:xfrm>
           <a:prstGeom prst="rect">
             <a:avLst/>
@@ -14574,7 +14566,7 @@
         </p:nvSpPr>
         <p:spPr>
           <a:xfrm>
-            <a:off x="193638" y="6250164"/>
+            <a:off x="193639" y="6250165"/>
             <a:ext cx="3786691" cy="365125"/>
           </a:xfrm>
           <a:prstGeom prst="rect">
@@ -14609,8 +14601,8 @@
         </p:nvSpPr>
         <p:spPr>
           <a:xfrm>
-            <a:off x="3991088" y="6250163"/>
-            <a:ext cx="1161826" cy="365125"/>
+            <a:off x="3991088" y="6250164"/>
+            <a:ext cx="1161827" cy="365125"/>
           </a:xfrm>
           <a:prstGeom prst="rect">
             <a:avLst/>
@@ -14649,7 +14641,7 @@
         </p:nvSpPr>
         <p:spPr>
           <a:xfrm>
-            <a:off x="872067" y="2675467"/>
+            <a:off x="872068" y="2675467"/>
             <a:ext cx="7408333" cy="3450696"/>
           </a:xfrm>
           <a:prstGeom prst="rect">
@@ -15205,9 +15197,10 @@
               <a:t>must respond with “success” per </a:t>
             </a:r>
             <a:r>
-              <a:rPr lang="en-US" dirty="0"/>
-              <a:t>“put” request</a:t>
-            </a:r>
+              <a:rPr lang="en-US" dirty="0" smtClean="0"/>
+              <a:t>“mutation”</a:t>
+            </a:r>
+            <a:endParaRPr lang="en-US" dirty="0"/>
           </a:p>
           <a:p>
             <a:r>
@@ -15300,7 +15293,7 @@
         </p:nvSpPr>
         <p:spPr>
           <a:xfrm>
-            <a:off x="872067" y="2675467"/>
+            <a:off x="872068" y="2675468"/>
             <a:ext cx="7408333" cy="3725333"/>
           </a:xfrm>
         </p:spPr>
@@ -15358,7 +15351,7 @@
           <a:p>
             <a:r>
               <a:rPr lang="en-US" dirty="0" smtClean="0"/>
-              <a:t>No joining</a:t>
+              <a:t>No “joins” like RDBMS</a:t>
             </a:r>
             <a:endParaRPr lang="en-US" dirty="0"/>
           </a:p>
@@ -15676,7 +15669,7 @@
         </p:nvSpPr>
         <p:spPr>
           <a:xfrm>
-            <a:off x="381000" y="2362200"/>
+            <a:off x="381002" y="2362201"/>
             <a:ext cx="8381999" cy="4190999"/>
           </a:xfrm>
         </p:spPr>
@@ -15851,19 +15844,19 @@
           </a:p>
           <a:p>
             <a:r>
-              <a:rPr lang="en-US" sz="2000" dirty="0" smtClean="0">
+              <a:rPr lang="en-US" dirty="0" smtClean="0">
                 <a:cs typeface="Courier New" pitchFamily="49" charset="0"/>
               </a:rPr>
               <a:t>Creates a single </a:t>
             </a:r>
             <a:r>
-              <a:rPr lang="en-US" sz="2000" dirty="0" err="1" smtClean="0">
+              <a:rPr lang="en-US" dirty="0" err="1" smtClean="0">
                 <a:cs typeface="Courier New" pitchFamily="49" charset="0"/>
               </a:rPr>
               <a:t>keyspace</a:t>
             </a:r>
             <a:r>
-              <a:rPr lang="en-US" sz="2000" dirty="0" smtClean="0">
+              <a:rPr lang="en-US" dirty="0" smtClean="0">
                 <a:cs typeface="Courier New" pitchFamily="49" charset="0"/>
               </a:rPr>
               <a:t>, blog.</a:t>
@@ -15871,23 +15864,32 @@
           </a:p>
           <a:p>
             <a:r>
-              <a:rPr lang="en-US" sz="2000" dirty="0" smtClean="0">
+              <a:rPr lang="en-US" dirty="0" smtClean="0">
                 <a:cs typeface="Courier New" pitchFamily="49" charset="0"/>
               </a:rPr>
               <a:t>Will hold all of our </a:t>
             </a:r>
             <a:r>
-              <a:rPr lang="en-US" sz="2000" dirty="0" err="1" smtClean="0">
+              <a:rPr lang="en-US" dirty="0" smtClean="0">
                 <a:cs typeface="Courier New" pitchFamily="49" charset="0"/>
               </a:rPr>
-              <a:t>ColumnFamily’s</a:t>
-            </a:r>
-            <a:r>
-              <a:rPr lang="en-US" sz="2000" dirty="0" smtClean="0">
+              <a:t>column </a:t>
+            </a:r>
+            <a:r>
+              <a:rPr lang="en-US" dirty="0" smtClean="0">
                 <a:cs typeface="Courier New" pitchFamily="49" charset="0"/>
               </a:rPr>
-              <a:t> (or Tables)</a:t>
-            </a:r>
+              <a:t>f</a:t>
+            </a:r>
+            <a:r>
+              <a:rPr lang="en-US" dirty="0" smtClean="0">
+                <a:cs typeface="Courier New" pitchFamily="49" charset="0"/>
+              </a:rPr>
+              <a:t>amilies</a:t>
+            </a:r>
+            <a:endParaRPr lang="en-US" dirty="0" smtClean="0">
+              <a:cs typeface="Courier New" pitchFamily="49" charset="0"/>
+            </a:endParaRPr>
           </a:p>
           <a:p>
             <a:pPr marL="0" indent="0">
@@ -15975,7 +15977,7 @@
         </p:nvSpPr>
         <p:spPr>
           <a:xfrm>
-            <a:off x="381000" y="2362200"/>
+            <a:off x="381002" y="2362201"/>
             <a:ext cx="8381999" cy="4190999"/>
           </a:xfrm>
         </p:spPr>
@@ -16079,6 +16081,27 @@
               </a:rPr>
               <a:t>}</a:t>
             </a:r>
+          </a:p>
+          <a:p>
+            <a:pPr marL="457200" indent="-457200">
+              <a:buFont typeface="+mj-lt"/>
+              <a:buAutoNum type="arabicPeriod"/>
+            </a:pPr>
+            <a:endParaRPr lang="en-US" sz="2000" dirty="0">
+              <a:latin typeface="Courier New" pitchFamily="49" charset="0"/>
+              <a:cs typeface="Courier New" pitchFamily="49" charset="0"/>
+            </a:endParaRPr>
+          </a:p>
+          <a:p>
+            <a:r>
+              <a:rPr lang="en-US" dirty="0" smtClean="0">
+                <a:cs typeface="Courier New" pitchFamily="49" charset="0"/>
+              </a:rPr>
+              <a:t>How do we model this in Cassandra?</a:t>
+            </a:r>
+            <a:endParaRPr lang="en-US" dirty="0" smtClean="0">
+              <a:cs typeface="Courier New" pitchFamily="49" charset="0"/>
+            </a:endParaRPr>
           </a:p>
           <a:p>
             <a:pPr marL="0" indent="0">
@@ -16262,7 +16285,7 @@
         </p:nvSpPr>
         <p:spPr>
           <a:xfrm>
-            <a:off x="381000" y="2362200"/>
+            <a:off x="381002" y="2362201"/>
             <a:ext cx="8381999" cy="4190999"/>
           </a:xfrm>
         </p:spPr>
@@ -16574,6 +16597,12 @@
           <a:p>
             <a:r>
               <a:rPr lang="en-US" dirty="0" smtClean="0"/>
+              <a:t>We would also like to see the posts in chronological order (most recent first)</a:t>
+            </a:r>
+          </a:p>
+          <a:p>
+            <a:r>
+              <a:rPr lang="en-US" dirty="0" smtClean="0"/>
               <a:t>Can’t do joins in Cassandra – </a:t>
             </a:r>
             <a:r>
@@ -16581,10 +16610,26 @@
               <a:t>booooo</a:t>
             </a:r>
             <a:r>
+              <a:rPr lang="en-US" dirty="0" smtClean="0"/>
+              <a:t>!</a:t>
+            </a:r>
+          </a:p>
+          <a:p>
+            <a:r>
+              <a:rPr lang="en-US" dirty="0" smtClean="0"/>
+              <a:t>Hint: columns </a:t>
+            </a:r>
+            <a:r>
+              <a:rPr lang="en-US" dirty="0" smtClean="0"/>
+              <a:t>within a row are sorted!</a:t>
+            </a:r>
+            <a:endParaRPr lang="en-US" dirty="0" smtClean="0"/>
+          </a:p>
+          <a:p>
+            <a:r>
               <a:rPr lang="en-US" dirty="0"/>
-              <a:t>!</a:t>
-            </a:r>
-            <a:endParaRPr lang="en-US" dirty="0" smtClean="0"/>
+              <a:t>Hint: Writes are super fast!</a:t>
+            </a:r>
           </a:p>
           <a:p>
             <a:endParaRPr lang="en-US" dirty="0"/>
@@ -16673,7 +16718,7 @@
         <p:spPr/>
         <p:txBody>
           <a:bodyPr>
-            <a:normAutofit fontScale="92500" lnSpcReduction="20000"/>
+            <a:normAutofit fontScale="92500" lnSpcReduction="10000"/>
           </a:bodyPr>
           <a:lstStyle/>
           <a:p>
@@ -16708,16 +16753,16 @@
           </a:p>
           <a:p>
             <a:r>
-              <a:rPr lang="en-US" dirty="0" smtClean="0"/>
-              <a:t>Need a new </a:t>
-            </a:r>
-            <a:r>
               <a:rPr lang="en-US" dirty="0" err="1" smtClean="0"/>
               <a:t>ColumnFamily</a:t>
             </a:r>
             <a:r>
               <a:rPr lang="en-US" dirty="0" smtClean="0"/>
-              <a:t> to connect Posts to a User (key = user email, column names = Post IDs, column values are empty)</a:t>
+              <a:t> to connect </a:t>
+            </a:r>
+            <a:r>
+              <a:rPr lang="en-US" dirty="0" smtClean="0"/>
+              <a:t>Posts to a User (key = user email, column names = Post IDs, column values are empty)</a:t>
             </a:r>
           </a:p>
           <a:p>
@@ -16780,7 +16825,9 @@
         </p:nvSpPr>
         <p:spPr/>
         <p:txBody>
-          <a:bodyPr/>
+          <a:bodyPr>
+            <a:normAutofit/>
+          </a:bodyPr>
           <a:lstStyle/>
           <a:p>
             <a:r>
@@ -16931,13 +16978,13 @@
         </p:nvSpPr>
         <p:spPr>
           <a:xfrm>
-            <a:off x="381000" y="2362200"/>
+            <a:off x="381000" y="2362201"/>
             <a:ext cx="8458200" cy="4190999"/>
           </a:xfrm>
         </p:spPr>
         <p:txBody>
           <a:bodyPr>
-            <a:normAutofit/>
+            <a:normAutofit lnSpcReduction="10000"/>
           </a:bodyPr>
           <a:lstStyle/>
           <a:p>
@@ -17085,6 +17132,14 @@
           </a:p>
           <a:p>
             <a:r>
+              <a:rPr lang="en-US" dirty="0" smtClean="0">
+                <a:cs typeface="Courier New" pitchFamily="49" charset="0"/>
+              </a:rPr>
+              <a:t>Make Post’s ID a time based UUID (type 1)</a:t>
+            </a:r>
+          </a:p>
+          <a:p>
+            <a:r>
               <a:rPr lang="en-US" dirty="0" err="1" smtClean="0">
                 <a:cs typeface="Courier New" pitchFamily="49" charset="0"/>
               </a:rPr>
@@ -17094,7 +17149,13 @@
               <a:rPr lang="en-US" dirty="0" smtClean="0">
                 <a:cs typeface="Courier New" pitchFamily="49" charset="0"/>
               </a:rPr>
-              <a:t> orders the column names by time, but also guarantees uniqueness</a:t>
+              <a:t> </a:t>
+            </a:r>
+            <a:r>
+              <a:rPr lang="en-US" dirty="0" smtClean="0">
+                <a:cs typeface="Courier New" pitchFamily="49" charset="0"/>
+              </a:rPr>
+              <a:t>orders the column names by time, but also guarantees uniqueness</a:t>
             </a:r>
           </a:p>
           <a:p>
@@ -17199,20 +17260,13 @@
         <p:spPr/>
         <p:txBody>
           <a:bodyPr>
-            <a:normAutofit fontScale="90000"/>
+            <a:normAutofit/>
           </a:bodyPr>
           <a:lstStyle/>
           <a:p>
             <a:r>
               <a:rPr lang="en-US" dirty="0" smtClean="0"/>
-              <a:t>Modeling an Index</a:t>
-            </a:r>
-            <a:br>
-              <a:rPr lang="en-US" dirty="0" smtClean="0"/>
-            </a:br>
-            <a:r>
-              <a:rPr lang="en-US" dirty="0" smtClean="0"/>
-              <a:t>(Posts sorted by time or vote)</a:t>
+              <a:t>Posts Retrievable By Time</a:t>
             </a:r>
             <a:endParaRPr lang="en-US" dirty="0"/>
           </a:p>
@@ -17231,78 +17285,40 @@
         <p:spPr/>
         <p:txBody>
           <a:bodyPr>
-            <a:normAutofit lnSpcReduction="10000"/>
+            <a:normAutofit/>
           </a:bodyPr>
           <a:lstStyle/>
           <a:p>
             <a:r>
               <a:rPr lang="en-US" dirty="0" smtClean="0"/>
-              <a:t>Cassandra has indexing capabilities, but limited – must always have an “equals” clause</a:t>
+              <a:t>We need the ability to search by a time range</a:t>
             </a:r>
           </a:p>
           <a:p>
             <a:r>
               <a:rPr lang="en-US" dirty="0" smtClean="0"/>
-              <a:t>We need to query for Posts over time range, so we won’t have an “equals”</a:t>
+              <a:t>We need the ability to return the N most recent posts</a:t>
             </a:r>
           </a:p>
           <a:p>
             <a:r>
               <a:rPr lang="en-US" dirty="0" smtClean="0"/>
-              <a:t>Every “index” requires an extra mutation</a:t>
+              <a:t>Cannot use C* index because we don’t have an “equals” clause</a:t>
             </a:r>
           </a:p>
           <a:p>
             <a:r>
               <a:rPr lang="en-US" dirty="0" smtClean="0"/>
-              <a:t>This is fine for Cassandra </a:t>
-            </a:r>
-            <a:r>
-              <a:rPr lang="en-US" dirty="0" err="1" smtClean="0"/>
-              <a:t>cuz</a:t>
-            </a:r>
-            <a:r>
-              <a:rPr lang="en-US" dirty="0" smtClean="0"/>
-              <a:t> mutations are super </a:t>
-            </a:r>
-            <a:r>
-              <a:rPr lang="en-US" dirty="0" err="1" smtClean="0"/>
-              <a:t>super</a:t>
-            </a:r>
-            <a:r>
-              <a:rPr lang="en-US" dirty="0" smtClean="0"/>
-              <a:t> </a:t>
-            </a:r>
-            <a:r>
-              <a:rPr lang="en-US" dirty="0" err="1" smtClean="0"/>
-              <a:t>super</a:t>
-            </a:r>
-            <a:r>
-              <a:rPr lang="en-US" dirty="0" smtClean="0"/>
-              <a:t> </a:t>
-            </a:r>
-            <a:r>
-              <a:rPr lang="en-US" dirty="0" err="1" smtClean="0"/>
-              <a:t>super</a:t>
-            </a:r>
-            <a:r>
-              <a:rPr lang="en-US" dirty="0" smtClean="0"/>
-              <a:t> fast!</a:t>
-            </a:r>
-          </a:p>
-          <a:p>
-            <a:r>
-              <a:rPr lang="en-US" dirty="0" smtClean="0"/>
-              <a:t>Really not doing anything different than the typical </a:t>
-            </a:r>
-            <a:r>
-              <a:rPr lang="en-US" dirty="0" smtClean="0"/>
-              <a:t>RDBMS</a:t>
-            </a:r>
-            <a:r>
-              <a:rPr lang="en-US" dirty="0" smtClean="0"/>
-              <a:t>, except we must manage our own indices</a:t>
-            </a:r>
+              <a:t>Hint:  columns within a row are sorted!</a:t>
+            </a:r>
+          </a:p>
+          <a:p>
+            <a:r>
+              <a:rPr lang="en-US" dirty="0"/>
+              <a:t>Hint: Writes are super fast!</a:t>
+            </a:r>
+          </a:p>
+          <a:p>
             <a:endParaRPr lang="en-US" dirty="0"/>
           </a:p>
         </p:txBody>
@@ -17346,224 +17362,7 @@
       </p:grpSpPr>
       <p:sp>
         <p:nvSpPr>
-          <p:cNvPr id="2" name="Content Placeholder 1"/>
-          <p:cNvSpPr>
-            <a:spLocks noGrp="1"/>
-          </p:cNvSpPr>
-          <p:nvPr>
-            <p:ph idx="1"/>
-          </p:nvPr>
-        </p:nvSpPr>
-        <p:spPr>
-          <a:xfrm>
-            <a:off x="381000" y="2362200"/>
-            <a:ext cx="8381999" cy="4190999"/>
-          </a:xfrm>
-        </p:spPr>
-        <p:txBody>
-          <a:bodyPr>
-            <a:normAutofit/>
-          </a:bodyPr>
-          <a:lstStyle/>
-          <a:p>
-            <a:pPr marL="457200" indent="-457200">
-              <a:buFont typeface="+mj-lt"/>
-              <a:buAutoNum type="arabicPeriod"/>
-            </a:pPr>
-            <a:r>
-              <a:rPr lang="en-US" sz="2000" dirty="0" smtClean="0">
-                <a:latin typeface="Courier New" pitchFamily="49" charset="0"/>
-                <a:cs typeface="Courier New" pitchFamily="49" charset="0"/>
-              </a:rPr>
-              <a:t>use blog;</a:t>
-            </a:r>
-          </a:p>
-          <a:p>
-            <a:pPr marL="457200" indent="-457200">
-              <a:buFont typeface="+mj-lt"/>
-              <a:buAutoNum type="arabicPeriod"/>
-            </a:pPr>
-            <a:r>
-              <a:rPr lang="en-US" sz="2000" dirty="0">
-                <a:latin typeface="Courier New" pitchFamily="49" charset="0"/>
-                <a:cs typeface="Courier New" pitchFamily="49" charset="0"/>
-              </a:rPr>
-              <a:t>create column family </a:t>
-            </a:r>
-            <a:r>
-              <a:rPr lang="en-US" sz="2000" dirty="0" err="1">
-                <a:latin typeface="Courier New" pitchFamily="49" charset="0"/>
-                <a:cs typeface="Courier New" pitchFamily="49" charset="0"/>
-              </a:rPr>
-              <a:t>posts_sorted_by_vote</a:t>
-            </a:r>
-            <a:endParaRPr lang="en-US" sz="2000" dirty="0">
-              <a:latin typeface="Courier New" pitchFamily="49" charset="0"/>
-              <a:cs typeface="Courier New" pitchFamily="49" charset="0"/>
-            </a:endParaRPr>
-          </a:p>
-          <a:p>
-            <a:pPr marL="457200" indent="-457200">
-              <a:buFont typeface="+mj-lt"/>
-              <a:buAutoNum type="arabicPeriod"/>
-            </a:pPr>
-            <a:r>
-              <a:rPr lang="en-US" sz="2000" dirty="0">
-                <a:latin typeface="Courier New" pitchFamily="49" charset="0"/>
-                <a:cs typeface="Courier New" pitchFamily="49" charset="0"/>
-              </a:rPr>
-              <a:t>    with comment = 'Index </a:t>
-            </a:r>
-            <a:r>
-              <a:rPr lang="en-US" sz="2000" dirty="0" smtClean="0">
-                <a:latin typeface="Courier New" pitchFamily="49" charset="0"/>
-                <a:cs typeface="Courier New" pitchFamily="49" charset="0"/>
-              </a:rPr>
-              <a:t>: posts </a:t>
-            </a:r>
-            <a:r>
-              <a:rPr lang="en-US" sz="2000" dirty="0">
-                <a:latin typeface="Courier New" pitchFamily="49" charset="0"/>
-                <a:cs typeface="Courier New" pitchFamily="49" charset="0"/>
-              </a:rPr>
-              <a:t>by vote'</a:t>
-            </a:r>
-          </a:p>
-          <a:p>
-            <a:pPr marL="457200" indent="-457200">
-              <a:buFont typeface="+mj-lt"/>
-              <a:buAutoNum type="arabicPeriod"/>
-            </a:pPr>
-            <a:r>
-              <a:rPr lang="en-US" sz="2000" dirty="0">
-                <a:latin typeface="Courier New" pitchFamily="49" charset="0"/>
-                <a:cs typeface="Courier New" pitchFamily="49" charset="0"/>
-              </a:rPr>
-              <a:t>    and comparator </a:t>
-            </a:r>
-            <a:r>
-              <a:rPr lang="en-US" sz="2000" dirty="0" smtClean="0">
-                <a:latin typeface="Courier New" pitchFamily="49" charset="0"/>
-                <a:cs typeface="Courier New" pitchFamily="49" charset="0"/>
-              </a:rPr>
-              <a:t>= '</a:t>
-            </a:r>
-            <a:r>
-              <a:rPr lang="en-US" sz="2000" b="1" dirty="0" err="1" smtClean="0">
-                <a:latin typeface="Courier New" pitchFamily="49" charset="0"/>
-                <a:cs typeface="Courier New" pitchFamily="49" charset="0"/>
-              </a:rPr>
-              <a:t>CompositeType</a:t>
-            </a:r>
-            <a:r>
-              <a:rPr lang="en-US" sz="2000" b="1" dirty="0" smtClean="0">
-                <a:latin typeface="Courier New" pitchFamily="49" charset="0"/>
-                <a:cs typeface="Courier New" pitchFamily="49" charset="0"/>
-              </a:rPr>
-              <a:t>(</a:t>
-            </a:r>
-            <a:r>
-              <a:rPr lang="en-US" sz="2000" b="1" dirty="0" err="1" smtClean="0">
-                <a:latin typeface="Courier New" pitchFamily="49" charset="0"/>
-                <a:cs typeface="Courier New" pitchFamily="49" charset="0"/>
-              </a:rPr>
-              <a:t>LongType</a:t>
-            </a:r>
-            <a:r>
-              <a:rPr lang="en-US" sz="2000" b="1" dirty="0" smtClean="0">
-                <a:latin typeface="Courier New" pitchFamily="49" charset="0"/>
-                <a:cs typeface="Courier New" pitchFamily="49" charset="0"/>
-              </a:rPr>
-              <a:t>(reversed=true</a:t>
-            </a:r>
-            <a:r>
-              <a:rPr lang="en-US" sz="2000" b="1" dirty="0">
-                <a:latin typeface="Courier New" pitchFamily="49" charset="0"/>
-                <a:cs typeface="Courier New" pitchFamily="49" charset="0"/>
-              </a:rPr>
-              <a:t>), </a:t>
-            </a:r>
-            <a:r>
-              <a:rPr lang="en-US" sz="2000" b="1" dirty="0" err="1">
-                <a:latin typeface="Courier New" pitchFamily="49" charset="0"/>
-                <a:cs typeface="Courier New" pitchFamily="49" charset="0"/>
-              </a:rPr>
-              <a:t>TimeUUIDType</a:t>
-            </a:r>
-            <a:r>
-              <a:rPr lang="en-US" sz="2000" b="1" dirty="0" smtClean="0">
-                <a:latin typeface="Courier New" pitchFamily="49" charset="0"/>
-                <a:cs typeface="Courier New" pitchFamily="49" charset="0"/>
-              </a:rPr>
-              <a:t>)</a:t>
-            </a:r>
-            <a:r>
-              <a:rPr lang="en-US" sz="2000" dirty="0" smtClean="0">
-                <a:latin typeface="Courier New" pitchFamily="49" charset="0"/>
-                <a:cs typeface="Courier New" pitchFamily="49" charset="0"/>
-              </a:rPr>
-              <a:t>‘</a:t>
-            </a:r>
-            <a:r>
-              <a:rPr lang="en-US" sz="2000" dirty="0">
-                <a:latin typeface="Courier New" pitchFamily="49" charset="0"/>
-                <a:cs typeface="Courier New" pitchFamily="49" charset="0"/>
-              </a:rPr>
-              <a:t>;</a:t>
-            </a:r>
-            <a:endParaRPr lang="en-US" sz="2000" dirty="0">
-              <a:latin typeface="Courier New" pitchFamily="49" charset="0"/>
-              <a:cs typeface="Courier New" pitchFamily="49" charset="0"/>
-            </a:endParaRPr>
-          </a:p>
-          <a:p>
-            <a:pPr marL="457200" indent="-457200">
-              <a:buFont typeface="+mj-lt"/>
-              <a:buAutoNum type="arabicPeriod"/>
-            </a:pPr>
-            <a:endParaRPr lang="en-US" sz="2000" dirty="0">
-              <a:latin typeface="Courier New" pitchFamily="49" charset="0"/>
-              <a:cs typeface="Courier New" pitchFamily="49" charset="0"/>
-            </a:endParaRPr>
-          </a:p>
-          <a:p>
-            <a:r>
-              <a:rPr lang="en-US" dirty="0" smtClean="0">
-                <a:cs typeface="Courier New" pitchFamily="49" charset="0"/>
-              </a:rPr>
-              <a:t>Single row – good idea?</a:t>
-            </a:r>
-          </a:p>
-          <a:p>
-            <a:r>
-              <a:rPr lang="en-US" dirty="0" smtClean="0">
-                <a:cs typeface="Courier New" pitchFamily="49" charset="0"/>
-              </a:rPr>
-              <a:t>Composite </a:t>
-            </a:r>
-            <a:r>
-              <a:rPr lang="en-US" dirty="0" smtClean="0">
-                <a:cs typeface="Courier New" pitchFamily="49" charset="0"/>
-              </a:rPr>
-              <a:t>column names allow us to use multiple properties to form the column name, and sort by each component</a:t>
-            </a:r>
-          </a:p>
-          <a:p>
-            <a:r>
-              <a:rPr lang="en-US" dirty="0" smtClean="0">
-                <a:cs typeface="Courier New" pitchFamily="49" charset="0"/>
-              </a:rPr>
-              <a:t>Can only use “reversed” on first component</a:t>
-            </a:r>
-            <a:endParaRPr lang="en-US" dirty="0">
-              <a:cs typeface="Courier New" pitchFamily="49" charset="0"/>
-            </a:endParaRPr>
-          </a:p>
-        </p:txBody>
-      </p:sp>
-      <p:sp>
-        <p:nvSpPr>
-          <p:cNvPr id="3" name="Title 2"/>
+          <p:cNvPr id="4" name="Title 3"/>
           <p:cNvSpPr>
             <a:spLocks noGrp="1"/>
           </p:cNvSpPr>
@@ -17574,13 +17373,121 @@
         <p:spPr/>
         <p:txBody>
           <a:bodyPr>
-            <a:normAutofit/>
+            <a:normAutofit fontScale="90000"/>
           </a:bodyPr>
           <a:lstStyle/>
           <a:p>
             <a:r>
               <a:rPr lang="en-US" dirty="0" smtClean="0"/>
-              <a:t>Creating an Index</a:t>
+              <a:t>Modeling an Index</a:t>
+            </a:r>
+            <a:br>
+              <a:rPr lang="en-US" dirty="0" smtClean="0"/>
+            </a:br>
+            <a:r>
+              <a:rPr lang="en-US" dirty="0" smtClean="0"/>
+              <a:t>(All Posts </a:t>
+            </a:r>
+            <a:r>
+              <a:rPr lang="en-US" dirty="0" smtClean="0"/>
+              <a:t>sorted by </a:t>
+            </a:r>
+            <a:r>
+              <a:rPr lang="en-US" dirty="0" smtClean="0"/>
+              <a:t>time)</a:t>
+            </a:r>
+            <a:endParaRPr lang="en-US" dirty="0"/>
+          </a:p>
+        </p:txBody>
+      </p:sp>
+      <p:sp>
+        <p:nvSpPr>
+          <p:cNvPr id="5" name="Content Placeholder 4"/>
+          <p:cNvSpPr>
+            <a:spLocks noGrp="1"/>
+          </p:cNvSpPr>
+          <p:nvPr>
+            <p:ph idx="1"/>
+          </p:nvPr>
+        </p:nvSpPr>
+        <p:spPr/>
+        <p:txBody>
+          <a:bodyPr>
+            <a:normAutofit lnSpcReduction="10000"/>
+          </a:bodyPr>
+          <a:lstStyle/>
+          <a:p>
+            <a:r>
+              <a:rPr lang="en-US" dirty="0" smtClean="0"/>
+              <a:t>Cassandra has indexing capabilities, but limited – must always have an “equals” clause</a:t>
+            </a:r>
+          </a:p>
+          <a:p>
+            <a:r>
+              <a:rPr lang="en-US" dirty="0" smtClean="0"/>
+              <a:t>We need to query for Posts over time range, so we won’t have an “equals”</a:t>
+            </a:r>
+          </a:p>
+          <a:p>
+            <a:r>
+              <a:rPr lang="en-US" dirty="0" smtClean="0"/>
+              <a:t>Negative : every </a:t>
+            </a:r>
+            <a:r>
+              <a:rPr lang="en-US" dirty="0" smtClean="0"/>
+              <a:t>“index” requires an extra mutation</a:t>
+            </a:r>
+          </a:p>
+          <a:p>
+            <a:r>
+              <a:rPr lang="en-US" dirty="0" smtClean="0"/>
+              <a:t>This is fine for Cassandra </a:t>
+            </a:r>
+            <a:r>
+              <a:rPr lang="en-US" dirty="0" err="1" smtClean="0"/>
+              <a:t>cuz</a:t>
+            </a:r>
+            <a:r>
+              <a:rPr lang="en-US" dirty="0" smtClean="0"/>
+              <a:t> mutations are super </a:t>
+            </a:r>
+            <a:r>
+              <a:rPr lang="en-US" dirty="0" err="1" smtClean="0"/>
+              <a:t>super</a:t>
+            </a:r>
+            <a:r>
+              <a:rPr lang="en-US" dirty="0" smtClean="0"/>
+              <a:t> </a:t>
+            </a:r>
+            <a:r>
+              <a:rPr lang="en-US" dirty="0" err="1" smtClean="0"/>
+              <a:t>super</a:t>
+            </a:r>
+            <a:r>
+              <a:rPr lang="en-US" dirty="0" smtClean="0"/>
+              <a:t> </a:t>
+            </a:r>
+            <a:r>
+              <a:rPr lang="en-US" dirty="0" err="1" smtClean="0"/>
+              <a:t>super</a:t>
+            </a:r>
+            <a:r>
+              <a:rPr lang="en-US" dirty="0" smtClean="0"/>
+              <a:t> fast!</a:t>
+            </a:r>
+          </a:p>
+          <a:p>
+            <a:r>
+              <a:rPr lang="en-US" dirty="0" smtClean="0"/>
+              <a:t>Really not doing anything different than the typical </a:t>
+            </a:r>
+            <a:r>
+              <a:rPr lang="en-US" dirty="0" smtClean="0"/>
+              <a:t>RDBMS</a:t>
+            </a:r>
+            <a:r>
+              <a:rPr lang="en-US" dirty="0" smtClean="0"/>
+              <a:t>, except we must manage our own indices</a:t>
             </a:r>
             <a:endParaRPr lang="en-US" dirty="0"/>
           </a:p>
@@ -17589,7 +17496,7 @@
     </p:spTree>
     <p:extLst>
       <p:ext uri="{BB962C8B-B14F-4D97-AF65-F5344CB8AC3E}">
-        <p14:creationId xmlns:p14="http://schemas.microsoft.com/office/powerpoint/2010/main" val="989618420"/>
+        <p14:creationId xmlns:p14="http://schemas.microsoft.com/office/powerpoint/2010/main" val="615104885"/>
       </p:ext>
     </p:extLst>
   </p:cSld>
@@ -17633,42 +17540,185 @@
             <p:ph idx="1"/>
           </p:nvPr>
         </p:nvSpPr>
-        <p:spPr/>
+        <p:spPr>
+          <a:xfrm>
+            <a:off x="381002" y="2362201"/>
+            <a:ext cx="8381999" cy="4190999"/>
+          </a:xfrm>
+        </p:spPr>
         <p:txBody>
           <a:bodyPr>
-            <a:normAutofit fontScale="92500" lnSpcReduction="20000"/>
+            <a:normAutofit lnSpcReduction="10000"/>
           </a:bodyPr>
           <a:lstStyle/>
           <a:p>
-            <a:r>
-              <a:rPr lang="en-US" dirty="0" smtClean="0"/>
-              <a:t>Cassandra does not have a way to read-update-write safely (no transactions)</a:t>
-            </a:r>
-          </a:p>
-          <a:p>
-            <a:r>
-              <a:rPr lang="en-US" dirty="0" smtClean="0"/>
-              <a:t>Distributed counters were added to handle the specific case of incrementing integers</a:t>
-            </a:r>
-          </a:p>
-          <a:p>
-            <a:r>
-              <a:rPr lang="en-US" dirty="0" smtClean="0"/>
-              <a:t>However, they are not to be used for “sequence” generators – you tell Cassandra to update, but don’t know the value after update</a:t>
-            </a:r>
-          </a:p>
-          <a:p>
-            <a:r>
-              <a:rPr lang="en-US" dirty="0" smtClean="0"/>
-              <a:t>Counters can handle outages, network partitions, delays in replication</a:t>
-            </a:r>
-          </a:p>
-          <a:p>
-            <a:r>
-              <a:rPr lang="en-US" dirty="0" smtClean="0"/>
-              <a:t>… But, the only time they will accurately reflect reality is if the system is “at rest”</a:t>
-            </a:r>
-            <a:endParaRPr lang="en-US" dirty="0"/>
+            <a:pPr marL="457200" indent="-457200">
+              <a:buFont typeface="+mj-lt"/>
+              <a:buAutoNum type="arabicPeriod"/>
+            </a:pPr>
+            <a:r>
+              <a:rPr lang="en-US" sz="2000" dirty="0" smtClean="0">
+                <a:latin typeface="Courier New" pitchFamily="49" charset="0"/>
+                <a:cs typeface="Courier New" pitchFamily="49" charset="0"/>
+              </a:rPr>
+              <a:t>use blog;</a:t>
+            </a:r>
+          </a:p>
+          <a:p>
+            <a:pPr marL="457200" indent="-457200">
+              <a:buFont typeface="+mj-lt"/>
+              <a:buAutoNum type="arabicPeriod"/>
+            </a:pPr>
+            <a:r>
+              <a:rPr lang="en-US" sz="2000" dirty="0">
+                <a:latin typeface="Courier New" pitchFamily="49" charset="0"/>
+                <a:cs typeface="Courier New" pitchFamily="49" charset="0"/>
+              </a:rPr>
+              <a:t>create column family </a:t>
+            </a:r>
+            <a:r>
+              <a:rPr lang="en-US" sz="2000" dirty="0" err="1">
+                <a:latin typeface="Courier New" pitchFamily="49" charset="0"/>
+                <a:cs typeface="Courier New" pitchFamily="49" charset="0"/>
+              </a:rPr>
+              <a:t>posts_by_time</a:t>
+            </a:r>
+            <a:endParaRPr lang="en-US" sz="2000" dirty="0">
+              <a:latin typeface="Courier New" pitchFamily="49" charset="0"/>
+              <a:cs typeface="Courier New" pitchFamily="49" charset="0"/>
+            </a:endParaRPr>
+          </a:p>
+          <a:p>
+            <a:pPr marL="457200" indent="-457200">
+              <a:buFont typeface="+mj-lt"/>
+              <a:buAutoNum type="arabicPeriod"/>
+            </a:pPr>
+            <a:r>
+              <a:rPr lang="en-US" sz="2000" dirty="0">
+                <a:latin typeface="Courier New" pitchFamily="49" charset="0"/>
+                <a:cs typeface="Courier New" pitchFamily="49" charset="0"/>
+              </a:rPr>
+              <a:t>    with comment = 'Index for retrieving Posts by time - </a:t>
+            </a:r>
+            <a:r>
+              <a:rPr lang="en-US" sz="2000" b="1" dirty="0">
+                <a:latin typeface="Courier New" pitchFamily="49" charset="0"/>
+                <a:cs typeface="Courier New" pitchFamily="49" charset="0"/>
+              </a:rPr>
+              <a:t>keys are </a:t>
+            </a:r>
+            <a:r>
+              <a:rPr lang="en-US" sz="2000" b="1" dirty="0" smtClean="0">
+                <a:latin typeface="Courier New" pitchFamily="49" charset="0"/>
+                <a:cs typeface="Courier New" pitchFamily="49" charset="0"/>
+              </a:rPr>
+              <a:t>timestamps of </a:t>
+            </a:r>
+            <a:r>
+              <a:rPr lang="en-US" sz="2000" b="1" dirty="0">
+                <a:latin typeface="Courier New" pitchFamily="49" charset="0"/>
+                <a:cs typeface="Courier New" pitchFamily="49" charset="0"/>
+              </a:rPr>
+              <a:t>1 hour granularity</a:t>
+            </a:r>
+            <a:r>
+              <a:rPr lang="en-US" sz="2000" dirty="0">
+                <a:latin typeface="Courier New" pitchFamily="49" charset="0"/>
+                <a:cs typeface="Courier New" pitchFamily="49" charset="0"/>
+              </a:rPr>
+              <a:t>'</a:t>
+            </a:r>
+          </a:p>
+          <a:p>
+            <a:pPr marL="457200" indent="-457200">
+              <a:buFont typeface="+mj-lt"/>
+              <a:buAutoNum type="arabicPeriod"/>
+            </a:pPr>
+            <a:r>
+              <a:rPr lang="en-US" sz="2000" dirty="0">
+                <a:latin typeface="Courier New" pitchFamily="49" charset="0"/>
+                <a:cs typeface="Courier New" pitchFamily="49" charset="0"/>
+              </a:rPr>
+              <a:t>    and </a:t>
+            </a:r>
+            <a:r>
+              <a:rPr lang="en-US" sz="2000" dirty="0" err="1">
+                <a:latin typeface="Courier New" pitchFamily="49" charset="0"/>
+                <a:cs typeface="Courier New" pitchFamily="49" charset="0"/>
+              </a:rPr>
+              <a:t>key_validation_class</a:t>
+            </a:r>
+            <a:r>
+              <a:rPr lang="en-US" sz="2000" dirty="0">
+                <a:latin typeface="Courier New" pitchFamily="49" charset="0"/>
+                <a:cs typeface="Courier New" pitchFamily="49" charset="0"/>
+              </a:rPr>
+              <a:t> = 'UTF8Type'</a:t>
+            </a:r>
+          </a:p>
+          <a:p>
+            <a:pPr marL="457200" indent="-457200">
+              <a:buFont typeface="+mj-lt"/>
+              <a:buAutoNum type="arabicPeriod"/>
+            </a:pPr>
+            <a:r>
+              <a:rPr lang="en-US" sz="2000" dirty="0">
+                <a:latin typeface="Courier New" pitchFamily="49" charset="0"/>
+                <a:cs typeface="Courier New" pitchFamily="49" charset="0"/>
+              </a:rPr>
+              <a:t>    and comparator = '</a:t>
+            </a:r>
+            <a:r>
+              <a:rPr lang="en-US" sz="2000" dirty="0" err="1">
+                <a:latin typeface="Courier New" pitchFamily="49" charset="0"/>
+                <a:cs typeface="Courier New" pitchFamily="49" charset="0"/>
+              </a:rPr>
+              <a:t>TimeUUIDType</a:t>
+            </a:r>
+            <a:r>
+              <a:rPr lang="en-US" sz="2000" dirty="0" smtClean="0">
+                <a:latin typeface="Courier New" pitchFamily="49" charset="0"/>
+                <a:cs typeface="Courier New" pitchFamily="49" charset="0"/>
+              </a:rPr>
+              <a:t>';</a:t>
+            </a:r>
+          </a:p>
+          <a:p>
+            <a:pPr marL="457200" indent="-457200">
+              <a:buFont typeface="+mj-lt"/>
+              <a:buAutoNum type="arabicPeriod"/>
+            </a:pPr>
+            <a:endParaRPr lang="en-US" sz="2000" dirty="0">
+              <a:latin typeface="Courier New" pitchFamily="49" charset="0"/>
+              <a:cs typeface="Courier New" pitchFamily="49" charset="0"/>
+            </a:endParaRPr>
+          </a:p>
+          <a:p>
+            <a:r>
+              <a:rPr lang="en-US" dirty="0" smtClean="0">
+                <a:cs typeface="Courier New" pitchFamily="49" charset="0"/>
+              </a:rPr>
+              <a:t>What’s that in the comment?  1 hour granularity?</a:t>
+            </a:r>
+            <a:endParaRPr lang="en-US" dirty="0">
+              <a:cs typeface="Courier New" pitchFamily="49" charset="0"/>
+            </a:endParaRPr>
+          </a:p>
+          <a:p>
+            <a:r>
+              <a:rPr lang="en-US" dirty="0" smtClean="0">
+                <a:cs typeface="Courier New" pitchFamily="49" charset="0"/>
+              </a:rPr>
+              <a:t>Why not use a single row?</a:t>
+            </a:r>
+          </a:p>
+          <a:p>
+            <a:r>
+              <a:rPr lang="en-US" dirty="0" smtClean="0">
+                <a:cs typeface="Courier New" pitchFamily="49" charset="0"/>
+              </a:rPr>
+              <a:t>It would eventually become huge and would only use RF nodes from the cluster</a:t>
+            </a:r>
           </a:p>
         </p:txBody>
       </p:sp>
@@ -17684,12 +17734,14 @@
         </p:nvSpPr>
         <p:spPr/>
         <p:txBody>
-          <a:bodyPr/>
+          <a:bodyPr>
+            <a:normAutofit/>
+          </a:bodyPr>
           <a:lstStyle/>
           <a:p>
             <a:r>
               <a:rPr lang="en-US" dirty="0" smtClean="0"/>
-              <a:t>How to Count – Really!</a:t>
+              <a:t>Creating an Index</a:t>
             </a:r>
             <a:endParaRPr lang="en-US" dirty="0"/>
           </a:p>
@@ -17698,7 +17750,7 @@
     </p:spTree>
     <p:extLst>
       <p:ext uri="{BB962C8B-B14F-4D97-AF65-F5344CB8AC3E}">
-        <p14:creationId xmlns:p14="http://schemas.microsoft.com/office/powerpoint/2010/main" val="2616893758"/>
+        <p14:creationId xmlns:p14="http://schemas.microsoft.com/office/powerpoint/2010/main" val="989618420"/>
       </p:ext>
     </p:extLst>
   </p:cSld>
@@ -17742,200 +17794,92 @@
             <p:ph idx="1"/>
           </p:nvPr>
         </p:nvSpPr>
-        <p:spPr>
-          <a:xfrm>
-            <a:off x="381000" y="2362200"/>
-            <a:ext cx="8381999" cy="4190999"/>
-          </a:xfrm>
-        </p:spPr>
+        <p:spPr/>
         <p:txBody>
           <a:bodyPr>
-            <a:normAutofit/>
+            <a:normAutofit fontScale="92500" lnSpcReduction="10000"/>
           </a:bodyPr>
           <a:lstStyle/>
           <a:p>
-            <a:pPr marL="457200" indent="-457200">
-              <a:buFont typeface="+mj-lt"/>
-              <a:buAutoNum type="arabicPeriod"/>
-            </a:pPr>
-            <a:r>
-              <a:rPr lang="en-US" sz="2000" dirty="0" smtClean="0">
-                <a:latin typeface="Courier New" pitchFamily="49" charset="0"/>
-                <a:cs typeface="Courier New" pitchFamily="49" charset="0"/>
-              </a:rPr>
-              <a:t>use blog;</a:t>
-            </a:r>
-          </a:p>
-          <a:p>
-            <a:pPr marL="457200" indent="-457200">
-              <a:buFont typeface="+mj-lt"/>
-              <a:buAutoNum type="arabicPeriod"/>
-            </a:pPr>
-            <a:r>
-              <a:rPr lang="en-US" sz="2000" dirty="0">
-                <a:latin typeface="Courier New" pitchFamily="49" charset="0"/>
-                <a:cs typeface="Courier New" pitchFamily="49" charset="0"/>
-              </a:rPr>
-              <a:t>create column family votes</a:t>
-            </a:r>
-          </a:p>
-          <a:p>
-            <a:pPr marL="457200" indent="-457200">
-              <a:buFont typeface="+mj-lt"/>
-              <a:buAutoNum type="arabicPeriod"/>
-            </a:pPr>
-            <a:r>
-              <a:rPr lang="en-US" sz="2000" dirty="0">
-                <a:latin typeface="Courier New" pitchFamily="49" charset="0"/>
-                <a:cs typeface="Courier New" pitchFamily="49" charset="0"/>
-              </a:rPr>
-              <a:t>    with comment = </a:t>
-            </a:r>
-            <a:r>
-              <a:rPr lang="en-US" sz="2000" dirty="0" smtClean="0">
-                <a:latin typeface="Courier New" pitchFamily="49" charset="0"/>
-                <a:cs typeface="Courier New" pitchFamily="49" charset="0"/>
-              </a:rPr>
-              <a:t>‘Voting counters'</a:t>
-            </a:r>
-            <a:endParaRPr lang="en-US" sz="2000" dirty="0">
-              <a:latin typeface="Courier New" pitchFamily="49" charset="0"/>
-              <a:cs typeface="Courier New" pitchFamily="49" charset="0"/>
-            </a:endParaRPr>
-          </a:p>
-          <a:p>
-            <a:pPr marL="457200" indent="-457200">
-              <a:buFont typeface="+mj-lt"/>
-              <a:buAutoNum type="arabicPeriod"/>
-            </a:pPr>
-            <a:r>
-              <a:rPr lang="en-US" sz="2000" dirty="0">
-                <a:latin typeface="Courier New" pitchFamily="49" charset="0"/>
-                <a:cs typeface="Courier New" pitchFamily="49" charset="0"/>
-              </a:rPr>
-              <a:t>    and </a:t>
-            </a:r>
-            <a:r>
-              <a:rPr lang="en-US" sz="2000" dirty="0" err="1">
-                <a:latin typeface="Courier New" pitchFamily="49" charset="0"/>
-                <a:cs typeface="Courier New" pitchFamily="49" charset="0"/>
-              </a:rPr>
-              <a:t>key_validation_class</a:t>
-            </a:r>
-            <a:r>
-              <a:rPr lang="en-US" sz="2000" dirty="0">
-                <a:latin typeface="Courier New" pitchFamily="49" charset="0"/>
-                <a:cs typeface="Courier New" pitchFamily="49" charset="0"/>
-              </a:rPr>
-              <a:t> = '</a:t>
-            </a:r>
-            <a:r>
-              <a:rPr lang="en-US" sz="2000" dirty="0" err="1">
-                <a:latin typeface="Courier New" pitchFamily="49" charset="0"/>
-                <a:cs typeface="Courier New" pitchFamily="49" charset="0"/>
-              </a:rPr>
-              <a:t>TimeUUIDType</a:t>
-            </a:r>
-            <a:r>
-              <a:rPr lang="en-US" sz="2000" dirty="0">
-                <a:latin typeface="Courier New" pitchFamily="49" charset="0"/>
-                <a:cs typeface="Courier New" pitchFamily="49" charset="0"/>
-              </a:rPr>
-              <a:t>'</a:t>
-            </a:r>
-          </a:p>
-          <a:p>
-            <a:pPr marL="457200" indent="-457200">
-              <a:buFont typeface="+mj-lt"/>
-              <a:buAutoNum type="arabicPeriod"/>
-            </a:pPr>
-            <a:r>
-              <a:rPr lang="en-US" sz="2000" dirty="0">
-                <a:latin typeface="Courier New" pitchFamily="49" charset="0"/>
-                <a:cs typeface="Courier New" pitchFamily="49" charset="0"/>
-              </a:rPr>
-              <a:t>    and </a:t>
-            </a:r>
-            <a:r>
-              <a:rPr lang="en-US" sz="2000" b="1" dirty="0" err="1">
-                <a:latin typeface="Courier New" pitchFamily="49" charset="0"/>
-                <a:cs typeface="Courier New" pitchFamily="49" charset="0"/>
-              </a:rPr>
-              <a:t>default_validation_class</a:t>
-            </a:r>
-            <a:r>
-              <a:rPr lang="en-US" sz="2000" b="1" dirty="0">
-                <a:latin typeface="Courier New" pitchFamily="49" charset="0"/>
-                <a:cs typeface="Courier New" pitchFamily="49" charset="0"/>
-              </a:rPr>
-              <a:t> = </a:t>
-            </a:r>
-            <a:r>
-              <a:rPr lang="en-US" sz="2000" b="1" dirty="0" err="1">
-                <a:latin typeface="Courier New" pitchFamily="49" charset="0"/>
-                <a:cs typeface="Courier New" pitchFamily="49" charset="0"/>
-              </a:rPr>
-              <a:t>CounterColumnType</a:t>
-            </a:r>
-            <a:endParaRPr lang="en-US" sz="2000" b="1" dirty="0">
-              <a:latin typeface="Courier New" pitchFamily="49" charset="0"/>
-              <a:cs typeface="Courier New" pitchFamily="49" charset="0"/>
-            </a:endParaRPr>
-          </a:p>
-          <a:p>
-            <a:pPr marL="457200" indent="-457200">
-              <a:buFont typeface="+mj-lt"/>
-              <a:buAutoNum type="arabicPeriod"/>
-            </a:pPr>
-            <a:r>
-              <a:rPr lang="en-US" sz="2000" dirty="0">
-                <a:latin typeface="Courier New" pitchFamily="49" charset="0"/>
-                <a:cs typeface="Courier New" pitchFamily="49" charset="0"/>
-              </a:rPr>
-              <a:t>    and comparator = 'UTF8Type'</a:t>
-            </a:r>
-          </a:p>
-          <a:p>
-            <a:pPr marL="457200" indent="-457200">
-              <a:buFont typeface="+mj-lt"/>
-              <a:buAutoNum type="arabicPeriod"/>
-            </a:pPr>
-            <a:r>
-              <a:rPr lang="en-US" sz="2000" dirty="0">
-                <a:latin typeface="Courier New" pitchFamily="49" charset="0"/>
-                <a:cs typeface="Courier New" pitchFamily="49" charset="0"/>
-              </a:rPr>
-              <a:t>    ;</a:t>
-            </a:r>
-          </a:p>
-          <a:p>
-            <a:pPr marL="457200" indent="-457200">
-              <a:buFont typeface="+mj-lt"/>
-              <a:buAutoNum type="arabicPeriod"/>
-            </a:pPr>
-            <a:endParaRPr lang="en-US" sz="2000" dirty="0">
-              <a:latin typeface="Courier New" pitchFamily="49" charset="0"/>
-              <a:cs typeface="Courier New" pitchFamily="49" charset="0"/>
-            </a:endParaRPr>
-          </a:p>
-          <a:p>
-            <a:r>
-              <a:rPr lang="en-US" dirty="0" smtClean="0">
-                <a:cs typeface="Courier New" pitchFamily="49" charset="0"/>
-              </a:rPr>
-              <a:t>Special validator signals counter column family</a:t>
-            </a:r>
-          </a:p>
-          <a:p>
-            <a:r>
-              <a:rPr lang="en-US" dirty="0" smtClean="0">
-                <a:cs typeface="Courier New" pitchFamily="49" charset="0"/>
-              </a:rPr>
-              <a:t>Can’t mix other column types with counter columns</a:t>
-            </a:r>
-            <a:endParaRPr lang="en-US" dirty="0">
-              <a:cs typeface="Courier New" pitchFamily="49" charset="0"/>
-            </a:endParaRPr>
+            <a:r>
+              <a:rPr lang="en-US" dirty="0" smtClean="0"/>
+              <a:t>Cassandra does not have a way to read-update-write safely (no </a:t>
+            </a:r>
+            <a:r>
+              <a:rPr lang="en-US" dirty="0" smtClean="0"/>
+              <a:t>transactions until 2.0)</a:t>
+            </a:r>
+            <a:endParaRPr lang="en-US" dirty="0" smtClean="0"/>
+          </a:p>
+          <a:p>
+            <a:r>
+              <a:rPr lang="en-US" dirty="0" smtClean="0"/>
+              <a:t>Distributed counters were added to handle the specific case of incrementing integers</a:t>
+            </a:r>
+          </a:p>
+          <a:p>
+            <a:r>
+              <a:rPr lang="en-US" dirty="0" smtClean="0"/>
+              <a:t>However, they are not </a:t>
+            </a:r>
+            <a:r>
+              <a:rPr lang="en-US" dirty="0" smtClean="0"/>
+              <a:t>called “distributed sequences” and *cannot* be </a:t>
+            </a:r>
+            <a:r>
+              <a:rPr lang="en-US" dirty="0" smtClean="0"/>
+              <a:t>used </a:t>
+            </a:r>
+            <a:r>
+              <a:rPr lang="en-US" dirty="0" smtClean="0"/>
+              <a:t>for generating unique IDs</a:t>
+            </a:r>
+            <a:endParaRPr lang="en-US" dirty="0" smtClean="0"/>
+          </a:p>
+          <a:p>
+            <a:r>
+              <a:rPr lang="en-US" dirty="0" smtClean="0"/>
+              <a:t>Counters can handle outages, network partitions, delays in replication</a:t>
+            </a:r>
+          </a:p>
+          <a:p>
+            <a:r>
+              <a:rPr lang="en-US" dirty="0" smtClean="0"/>
+              <a:t>… But, </a:t>
+            </a:r>
+            <a:r>
+              <a:rPr lang="en-US" dirty="0" smtClean="0"/>
+              <a:t>don’t count on them to be perfect – they </a:t>
+            </a:r>
+            <a:r>
+              <a:rPr lang="en-US" dirty="0" smtClean="0"/>
+              <a:t>will </a:t>
+            </a:r>
+            <a:r>
+              <a:rPr lang="en-US" dirty="0" smtClean="0"/>
+              <a:t>only reflect </a:t>
+            </a:r>
+            <a:r>
+              <a:rPr lang="en-US" dirty="0" smtClean="0"/>
+              <a:t>reality </a:t>
+            </a:r>
+            <a:r>
+              <a:rPr lang="en-US" dirty="0" smtClean="0"/>
+              <a:t>if </a:t>
+            </a:r>
+            <a:r>
+              <a:rPr lang="en-US" dirty="0" smtClean="0"/>
+              <a:t>the system is </a:t>
+            </a:r>
+            <a:r>
+              <a:rPr lang="en-US" dirty="0" smtClean="0"/>
+              <a:t>all caught up and “at </a:t>
+            </a:r>
+            <a:r>
+              <a:rPr lang="en-US" dirty="0" smtClean="0"/>
+              <a:t>rest”</a:t>
+            </a:r>
+            <a:endParaRPr lang="en-US" dirty="0"/>
           </a:p>
         </p:txBody>
       </p:sp>
@@ -17951,14 +17895,12 @@
         </p:nvSpPr>
         <p:spPr/>
         <p:txBody>
-          <a:bodyPr>
-            <a:normAutofit/>
-          </a:bodyPr>
+          <a:bodyPr/>
           <a:lstStyle/>
           <a:p>
             <a:r>
               <a:rPr lang="en-US" dirty="0" smtClean="0"/>
-              <a:t>Creating a Counter</a:t>
+              <a:t>How to Count – Really!</a:t>
             </a:r>
             <a:endParaRPr lang="en-US" dirty="0"/>
           </a:p>
@@ -17967,7 +17909,7 @@
     </p:spTree>
     <p:extLst>
       <p:ext uri="{BB962C8B-B14F-4D97-AF65-F5344CB8AC3E}">
-        <p14:creationId xmlns:p14="http://schemas.microsoft.com/office/powerpoint/2010/main" val="610113565"/>
+        <p14:creationId xmlns:p14="http://schemas.microsoft.com/office/powerpoint/2010/main" val="2616893758"/>
       </p:ext>
     </p:extLst>
   </p:cSld>
@@ -18011,36 +17953,315 @@
             <p:ph idx="1"/>
           </p:nvPr>
         </p:nvSpPr>
+        <p:spPr>
+          <a:xfrm>
+            <a:off x="381002" y="2362201"/>
+            <a:ext cx="8381999" cy="4190999"/>
+          </a:xfrm>
+        </p:spPr>
+        <p:txBody>
+          <a:bodyPr>
+            <a:normAutofit/>
+          </a:bodyPr>
+          <a:lstStyle/>
+          <a:p>
+            <a:pPr marL="457200" indent="-457200">
+              <a:buFont typeface="+mj-lt"/>
+              <a:buAutoNum type="arabicPeriod"/>
+            </a:pPr>
+            <a:r>
+              <a:rPr lang="en-US" sz="2000" dirty="0" smtClean="0">
+                <a:latin typeface="Courier New" pitchFamily="49" charset="0"/>
+                <a:cs typeface="Courier New" pitchFamily="49" charset="0"/>
+              </a:rPr>
+              <a:t>use blog;</a:t>
+            </a:r>
+          </a:p>
+          <a:p>
+            <a:pPr marL="457200" indent="-457200">
+              <a:buFont typeface="+mj-lt"/>
+              <a:buAutoNum type="arabicPeriod"/>
+            </a:pPr>
+            <a:r>
+              <a:rPr lang="en-US" sz="2000" dirty="0">
+                <a:latin typeface="Courier New" pitchFamily="49" charset="0"/>
+                <a:cs typeface="Courier New" pitchFamily="49" charset="0"/>
+              </a:rPr>
+              <a:t>create column family votes</a:t>
+            </a:r>
+          </a:p>
+          <a:p>
+            <a:pPr marL="457200" indent="-457200">
+              <a:buFont typeface="+mj-lt"/>
+              <a:buAutoNum type="arabicPeriod"/>
+            </a:pPr>
+            <a:r>
+              <a:rPr lang="en-US" sz="2000" dirty="0">
+                <a:latin typeface="Courier New" pitchFamily="49" charset="0"/>
+                <a:cs typeface="Courier New" pitchFamily="49" charset="0"/>
+              </a:rPr>
+              <a:t>    with comment = </a:t>
+            </a:r>
+            <a:r>
+              <a:rPr lang="en-US" sz="2000" dirty="0" smtClean="0">
+                <a:latin typeface="Courier New" pitchFamily="49" charset="0"/>
+                <a:cs typeface="Courier New" pitchFamily="49" charset="0"/>
+              </a:rPr>
+              <a:t>‘Voting counters'</a:t>
+            </a:r>
+            <a:endParaRPr lang="en-US" sz="2000" dirty="0">
+              <a:latin typeface="Courier New" pitchFamily="49" charset="0"/>
+              <a:cs typeface="Courier New" pitchFamily="49" charset="0"/>
+            </a:endParaRPr>
+          </a:p>
+          <a:p>
+            <a:pPr marL="457200" indent="-457200">
+              <a:buFont typeface="+mj-lt"/>
+              <a:buAutoNum type="arabicPeriod"/>
+            </a:pPr>
+            <a:r>
+              <a:rPr lang="en-US" sz="2000" dirty="0">
+                <a:latin typeface="Courier New" pitchFamily="49" charset="0"/>
+                <a:cs typeface="Courier New" pitchFamily="49" charset="0"/>
+              </a:rPr>
+              <a:t>    and </a:t>
+            </a:r>
+            <a:r>
+              <a:rPr lang="en-US" sz="2000" dirty="0" err="1">
+                <a:latin typeface="Courier New" pitchFamily="49" charset="0"/>
+                <a:cs typeface="Courier New" pitchFamily="49" charset="0"/>
+              </a:rPr>
+              <a:t>key_validation_class</a:t>
+            </a:r>
+            <a:r>
+              <a:rPr lang="en-US" sz="2000" dirty="0">
+                <a:latin typeface="Courier New" pitchFamily="49" charset="0"/>
+                <a:cs typeface="Courier New" pitchFamily="49" charset="0"/>
+              </a:rPr>
+              <a:t> = '</a:t>
+            </a:r>
+            <a:r>
+              <a:rPr lang="en-US" sz="2000" dirty="0" err="1">
+                <a:latin typeface="Courier New" pitchFamily="49" charset="0"/>
+                <a:cs typeface="Courier New" pitchFamily="49" charset="0"/>
+              </a:rPr>
+              <a:t>TimeUUIDType</a:t>
+            </a:r>
+            <a:r>
+              <a:rPr lang="en-US" sz="2000" dirty="0">
+                <a:latin typeface="Courier New" pitchFamily="49" charset="0"/>
+                <a:cs typeface="Courier New" pitchFamily="49" charset="0"/>
+              </a:rPr>
+              <a:t>'</a:t>
+            </a:r>
+          </a:p>
+          <a:p>
+            <a:pPr marL="457200" indent="-457200">
+              <a:buFont typeface="+mj-lt"/>
+              <a:buAutoNum type="arabicPeriod"/>
+            </a:pPr>
+            <a:r>
+              <a:rPr lang="en-US" sz="2000" dirty="0">
+                <a:latin typeface="Courier New" pitchFamily="49" charset="0"/>
+                <a:cs typeface="Courier New" pitchFamily="49" charset="0"/>
+              </a:rPr>
+              <a:t>    and </a:t>
+            </a:r>
+            <a:r>
+              <a:rPr lang="en-US" sz="2000" b="1" dirty="0" err="1">
+                <a:latin typeface="Courier New" pitchFamily="49" charset="0"/>
+                <a:cs typeface="Courier New" pitchFamily="49" charset="0"/>
+              </a:rPr>
+              <a:t>default_validation_class</a:t>
+            </a:r>
+            <a:r>
+              <a:rPr lang="en-US" sz="2000" b="1" dirty="0">
+                <a:latin typeface="Courier New" pitchFamily="49" charset="0"/>
+                <a:cs typeface="Courier New" pitchFamily="49" charset="0"/>
+              </a:rPr>
+              <a:t> = </a:t>
+            </a:r>
+            <a:r>
+              <a:rPr lang="en-US" sz="2000" b="1" dirty="0" err="1">
+                <a:latin typeface="Courier New" pitchFamily="49" charset="0"/>
+                <a:cs typeface="Courier New" pitchFamily="49" charset="0"/>
+              </a:rPr>
+              <a:t>CounterColumnType</a:t>
+            </a:r>
+            <a:endParaRPr lang="en-US" sz="2000" b="1" dirty="0">
+              <a:latin typeface="Courier New" pitchFamily="49" charset="0"/>
+              <a:cs typeface="Courier New" pitchFamily="49" charset="0"/>
+            </a:endParaRPr>
+          </a:p>
+          <a:p>
+            <a:pPr marL="457200" indent="-457200">
+              <a:buFont typeface="+mj-lt"/>
+              <a:buAutoNum type="arabicPeriod"/>
+            </a:pPr>
+            <a:r>
+              <a:rPr lang="en-US" sz="2000" dirty="0">
+                <a:latin typeface="Courier New" pitchFamily="49" charset="0"/>
+                <a:cs typeface="Courier New" pitchFamily="49" charset="0"/>
+              </a:rPr>
+              <a:t>    and comparator = 'UTF8Type'</a:t>
+            </a:r>
+          </a:p>
+          <a:p>
+            <a:pPr marL="457200" indent="-457200">
+              <a:buFont typeface="+mj-lt"/>
+              <a:buAutoNum type="arabicPeriod"/>
+            </a:pPr>
+            <a:r>
+              <a:rPr lang="en-US" sz="2000" dirty="0">
+                <a:latin typeface="Courier New" pitchFamily="49" charset="0"/>
+                <a:cs typeface="Courier New" pitchFamily="49" charset="0"/>
+              </a:rPr>
+              <a:t>    ;</a:t>
+            </a:r>
+          </a:p>
+          <a:p>
+            <a:pPr marL="457200" indent="-457200">
+              <a:buFont typeface="+mj-lt"/>
+              <a:buAutoNum type="arabicPeriod"/>
+            </a:pPr>
+            <a:endParaRPr lang="en-US" sz="2000" dirty="0">
+              <a:latin typeface="Courier New" pitchFamily="49" charset="0"/>
+              <a:cs typeface="Courier New" pitchFamily="49" charset="0"/>
+            </a:endParaRPr>
+          </a:p>
+          <a:p>
+            <a:r>
+              <a:rPr lang="en-US" dirty="0" smtClean="0">
+                <a:cs typeface="Courier New" pitchFamily="49" charset="0"/>
+              </a:rPr>
+              <a:t>Special validator signals counter column family</a:t>
+            </a:r>
+          </a:p>
+          <a:p>
+            <a:r>
+              <a:rPr lang="en-US" dirty="0" smtClean="0">
+                <a:cs typeface="Courier New" pitchFamily="49" charset="0"/>
+              </a:rPr>
+              <a:t>Can’t mix other column types with counter columns</a:t>
+            </a:r>
+            <a:endParaRPr lang="en-US" dirty="0">
+              <a:cs typeface="Courier New" pitchFamily="49" charset="0"/>
+            </a:endParaRPr>
+          </a:p>
+        </p:txBody>
+      </p:sp>
+      <p:sp>
+        <p:nvSpPr>
+          <p:cNvPr id="3" name="Title 2"/>
+          <p:cNvSpPr>
+            <a:spLocks noGrp="1"/>
+          </p:cNvSpPr>
+          <p:nvPr>
+            <p:ph type="title"/>
+          </p:nvPr>
+        </p:nvSpPr>
         <p:spPr/>
         <p:txBody>
-          <a:bodyPr/>
+          <a:bodyPr>
+            <a:normAutofit/>
+          </a:bodyPr>
           <a:lstStyle/>
           <a:p>
-            <a:pPr marL="0" indent="0">
-              <a:buNone/>
-            </a:pPr>
-            <a:r>
-              <a:rPr lang="en-US" dirty="0">
-                <a:hlinkClick r:id="rId2"/>
-              </a:rPr>
-              <a:t>https://</a:t>
-            </a:r>
-            <a:r>
-              <a:rPr lang="en-US" dirty="0" smtClean="0">
-                <a:hlinkClick r:id="rId2"/>
-              </a:rPr>
-              <a:t>github.disney.com/Data-Solutions/bloggie-blog</a:t>
-            </a:r>
-            <a:endParaRPr lang="en-US" dirty="0" smtClean="0"/>
-          </a:p>
-          <a:p>
-            <a:pPr marL="0" indent="0">
-              <a:buNone/>
-            </a:pPr>
-            <a:endParaRPr lang="en-US" dirty="0" smtClean="0"/>
-          </a:p>
-          <a:p>
-            <a:endParaRPr lang="en-US" dirty="0" smtClean="0"/>
+            <a:r>
+              <a:rPr lang="en-US" dirty="0" smtClean="0"/>
+              <a:t>Creating a Counter</a:t>
+            </a:r>
+            <a:endParaRPr lang="en-US" dirty="0"/>
+          </a:p>
+        </p:txBody>
+      </p:sp>
+    </p:spTree>
+    <p:extLst>
+      <p:ext uri="{BB962C8B-B14F-4D97-AF65-F5344CB8AC3E}">
+        <p14:creationId xmlns:p14="http://schemas.microsoft.com/office/powerpoint/2010/main" val="610113565"/>
+      </p:ext>
+    </p:extLst>
+  </p:cSld>
+  <p:clrMapOvr>
+    <a:masterClrMapping/>
+  </p:clrMapOvr>
+  <p:timing>
+    <p:tnLst>
+      <p:par>
+        <p:cTn id="1" dur="indefinite" restart="never" nodeType="tmRoot"/>
+      </p:par>
+    </p:tnLst>
+  </p:timing>
+</p:sld>
+</file>
+
+<file path=ppt/slides/slide26.xml><?xml version="1.0" encoding="utf-8"?>
+<p:sld xmlns:a="http://schemas.openxmlformats.org/drawingml/2006/main" xmlns:r="http://schemas.openxmlformats.org/officeDocument/2006/relationships" xmlns:p="http://schemas.openxmlformats.org/presentationml/2006/main">
+  <p:cSld>
+    <p:spTree>
+      <p:nvGrpSpPr>
+        <p:cNvPr id="1" name=""/>
+        <p:cNvGrpSpPr/>
+        <p:nvPr/>
+      </p:nvGrpSpPr>
+      <p:grpSpPr>
+        <a:xfrm>
+          <a:off x="0" y="0"/>
+          <a:ext cx="0" cy="0"/>
+          <a:chOff x="0" y="0"/>
+          <a:chExt cx="0" cy="0"/>
+        </a:xfrm>
+      </p:grpSpPr>
+      <p:sp>
+        <p:nvSpPr>
+          <p:cNvPr id="2" name="Content Placeholder 1"/>
+          <p:cNvSpPr>
+            <a:spLocks noGrp="1"/>
+          </p:cNvSpPr>
+          <p:nvPr>
+            <p:ph idx="1"/>
+          </p:nvPr>
+        </p:nvSpPr>
+        <p:spPr/>
+        <p:txBody>
+          <a:bodyPr>
+            <a:normAutofit lnSpcReduction="10000"/>
+          </a:bodyPr>
+          <a:lstStyle/>
+          <a:p>
+            <a:r>
+              <a:rPr lang="en-US" dirty="0"/>
+              <a:t>E</a:t>
+            </a:r>
+            <a:r>
+              <a:rPr lang="en-US" dirty="0" smtClean="0"/>
+              <a:t>asy enough to vote on posts and comments – just use a C* Counter!</a:t>
+            </a:r>
+          </a:p>
+          <a:p>
+            <a:r>
+              <a:rPr lang="en-US" dirty="0" smtClean="0"/>
+              <a:t>But, how do we retrieve the top XX posts in the last YY days?</a:t>
+            </a:r>
+          </a:p>
+          <a:p>
+            <a:r>
+              <a:rPr lang="en-US" dirty="0" smtClean="0"/>
+              <a:t>No way to tell, nor ask, Cassandra to sort them.  She doesn’t do that</a:t>
+            </a:r>
+          </a:p>
+          <a:p>
+            <a:r>
+              <a:rPr lang="en-US" dirty="0" smtClean="0"/>
+              <a:t>Hint: Columns are sorted within a row – but what row?</a:t>
+            </a:r>
+          </a:p>
+          <a:p>
+            <a:r>
+              <a:rPr lang="en-US" dirty="0" smtClean="0"/>
+              <a:t>Hint: Writes are super fast!</a:t>
+            </a:r>
+            <a:endParaRPr lang="en-US" dirty="0"/>
           </a:p>
         </p:txBody>
       </p:sp>
@@ -18061,7 +18282,7 @@
           <a:p>
             <a:r>
               <a:rPr lang="en-US" dirty="0" smtClean="0"/>
-              <a:t>The Code</a:t>
+              <a:t>Sorting Posts/Comments by Vote</a:t>
             </a:r>
             <a:endParaRPr lang="en-US" dirty="0"/>
           </a:p>
@@ -18070,13 +18291,403 @@
     </p:spTree>
     <p:extLst>
       <p:ext uri="{BB962C8B-B14F-4D97-AF65-F5344CB8AC3E}">
-        <p14:creationId xmlns:p14="http://schemas.microsoft.com/office/powerpoint/2010/main" val="2606787160"/>
+        <p14:creationId xmlns:p14="http://schemas.microsoft.com/office/powerpoint/2010/main" val="3404584288"/>
       </p:ext>
     </p:extLst>
   </p:cSld>
   <p:clrMapOvr>
     <a:masterClrMapping/>
   </p:clrMapOvr>
+  <p:timing>
+    <p:tnLst>
+      <p:par>
+        <p:cTn id="1" dur="indefinite" restart="never" nodeType="tmRoot"/>
+      </p:par>
+    </p:tnLst>
+  </p:timing>
+</p:sld>
+</file>
+
+<file path=ppt/slides/slide27.xml><?xml version="1.0" encoding="utf-8"?>
+<p:sld xmlns:a="http://schemas.openxmlformats.org/drawingml/2006/main" xmlns:r="http://schemas.openxmlformats.org/officeDocument/2006/relationships" xmlns:p="http://schemas.openxmlformats.org/presentationml/2006/main">
+  <p:cSld>
+    <p:spTree>
+      <p:nvGrpSpPr>
+        <p:cNvPr id="1" name=""/>
+        <p:cNvGrpSpPr/>
+        <p:nvPr/>
+      </p:nvGrpSpPr>
+      <p:grpSpPr>
+        <a:xfrm>
+          <a:off x="0" y="0"/>
+          <a:ext cx="0" cy="0"/>
+          <a:chOff x="0" y="0"/>
+          <a:chExt cx="0" cy="0"/>
+        </a:xfrm>
+      </p:grpSpPr>
+      <p:sp>
+        <p:nvSpPr>
+          <p:cNvPr id="2" name="Content Placeholder 1"/>
+          <p:cNvSpPr>
+            <a:spLocks noGrp="1"/>
+          </p:cNvSpPr>
+          <p:nvPr>
+            <p:ph idx="1"/>
+          </p:nvPr>
+        </p:nvSpPr>
+        <p:spPr/>
+        <p:txBody>
+          <a:bodyPr>
+            <a:normAutofit/>
+          </a:bodyPr>
+          <a:lstStyle/>
+          <a:p>
+            <a:r>
+              <a:rPr lang="en-US" dirty="0" smtClean="0"/>
+              <a:t>We use another </a:t>
+            </a:r>
+            <a:r>
+              <a:rPr lang="en-US" dirty="0"/>
+              <a:t>column family, </a:t>
+            </a:r>
+            <a:r>
+              <a:rPr lang="en-US" dirty="0" err="1" smtClean="0"/>
+              <a:t>posts_sorted_by_vote</a:t>
+            </a:r>
+            <a:endParaRPr lang="en-US" dirty="0" smtClean="0"/>
+          </a:p>
+          <a:p>
+            <a:r>
+              <a:rPr lang="en-US" dirty="0" smtClean="0"/>
+              <a:t>We store the </a:t>
+            </a:r>
+            <a:r>
+              <a:rPr lang="en-US" dirty="0" err="1" smtClean="0"/>
+              <a:t>the</a:t>
+            </a:r>
+            <a:r>
+              <a:rPr lang="en-US" dirty="0" smtClean="0"/>
+              <a:t> top XX post IDs over the last YY days in a single row</a:t>
+            </a:r>
+          </a:p>
+          <a:p>
+            <a:r>
+              <a:rPr lang="en-US" dirty="0" smtClean="0"/>
+              <a:t>A composite column name is used to sort by number of votes and provide uniqueness</a:t>
+            </a:r>
+          </a:p>
+          <a:p>
+            <a:r>
+              <a:rPr lang="en-US" dirty="0" smtClean="0"/>
+              <a:t>What’s a composite column name?</a:t>
+            </a:r>
+          </a:p>
+          <a:p>
+            <a:r>
+              <a:rPr lang="en-US" dirty="0" smtClean="0"/>
+              <a:t>What’s wrong with this?</a:t>
+            </a:r>
+          </a:p>
+          <a:p>
+            <a:r>
+              <a:rPr lang="en-US" dirty="0" smtClean="0"/>
+              <a:t>When do we update the row?</a:t>
+            </a:r>
+            <a:endParaRPr lang="en-US" dirty="0"/>
+          </a:p>
+        </p:txBody>
+      </p:sp>
+      <p:sp>
+        <p:nvSpPr>
+          <p:cNvPr id="3" name="Title 2"/>
+          <p:cNvSpPr>
+            <a:spLocks noGrp="1"/>
+          </p:cNvSpPr>
+          <p:nvPr>
+            <p:ph type="title"/>
+          </p:nvPr>
+        </p:nvSpPr>
+        <p:spPr/>
+        <p:txBody>
+          <a:bodyPr/>
+          <a:lstStyle/>
+          <a:p>
+            <a:r>
+              <a:rPr lang="en-US" dirty="0" smtClean="0"/>
+              <a:t>Sorting Posts by Vote</a:t>
+            </a:r>
+            <a:endParaRPr lang="en-US" dirty="0"/>
+          </a:p>
+        </p:txBody>
+      </p:sp>
+    </p:spTree>
+    <p:extLst>
+      <p:ext uri="{BB962C8B-B14F-4D97-AF65-F5344CB8AC3E}">
+        <p14:creationId xmlns:p14="http://schemas.microsoft.com/office/powerpoint/2010/main" val="811431599"/>
+      </p:ext>
+    </p:extLst>
+  </p:cSld>
+  <p:clrMapOvr>
+    <a:masterClrMapping/>
+  </p:clrMapOvr>
+  <p:timing>
+    <p:tnLst>
+      <p:par>
+        <p:cTn id="1" dur="indefinite" restart="never" nodeType="tmRoot"/>
+      </p:par>
+    </p:tnLst>
+  </p:timing>
+</p:sld>
+</file>
+
+<file path=ppt/slides/slide28.xml><?xml version="1.0" encoding="utf-8"?>
+<p:sld xmlns:a="http://schemas.openxmlformats.org/drawingml/2006/main" xmlns:r="http://schemas.openxmlformats.org/officeDocument/2006/relationships" xmlns:p="http://schemas.openxmlformats.org/presentationml/2006/main">
+  <p:cSld>
+    <p:spTree>
+      <p:nvGrpSpPr>
+        <p:cNvPr id="1" name=""/>
+        <p:cNvGrpSpPr/>
+        <p:nvPr/>
+      </p:nvGrpSpPr>
+      <p:grpSpPr>
+        <a:xfrm>
+          <a:off x="0" y="0"/>
+          <a:ext cx="0" cy="0"/>
+          <a:chOff x="0" y="0"/>
+          <a:chExt cx="0" cy="0"/>
+        </a:xfrm>
+      </p:grpSpPr>
+      <p:sp>
+        <p:nvSpPr>
+          <p:cNvPr id="2" name="Content Placeholder 1"/>
+          <p:cNvSpPr>
+            <a:spLocks noGrp="1"/>
+          </p:cNvSpPr>
+          <p:nvPr>
+            <p:ph idx="1"/>
+          </p:nvPr>
+        </p:nvSpPr>
+        <p:spPr/>
+        <p:txBody>
+          <a:bodyPr>
+            <a:normAutofit/>
+          </a:bodyPr>
+          <a:lstStyle/>
+          <a:p>
+            <a:r>
+              <a:rPr lang="en-US" dirty="0" smtClean="0"/>
+              <a:t>We use another </a:t>
+            </a:r>
+            <a:r>
+              <a:rPr lang="en-US" dirty="0"/>
+              <a:t>column family, </a:t>
+            </a:r>
+            <a:r>
+              <a:rPr lang="en-US" dirty="0" err="1"/>
+              <a:t>post_comments_sorted_by_vote</a:t>
+            </a:r>
+            <a:endParaRPr lang="en-US" dirty="0" smtClean="0"/>
+          </a:p>
+          <a:p>
+            <a:r>
+              <a:rPr lang="en-US" dirty="0" smtClean="0"/>
+              <a:t>Same composite column name as with posts</a:t>
+            </a:r>
+          </a:p>
+          <a:p>
+            <a:r>
+              <a:rPr lang="en-US" dirty="0" smtClean="0"/>
+              <a:t>So by now you probably see the pattern – use rows to sort stuff</a:t>
+            </a:r>
+          </a:p>
+          <a:p>
+            <a:r>
+              <a:rPr lang="en-US" dirty="0" smtClean="0"/>
+              <a:t>Since comments are sorted for a given Post, I decided to use another column family to indicate when a Post’s comments need to be sorted</a:t>
+            </a:r>
+          </a:p>
+        </p:txBody>
+      </p:sp>
+      <p:sp>
+        <p:nvSpPr>
+          <p:cNvPr id="3" name="Title 2"/>
+          <p:cNvSpPr>
+            <a:spLocks noGrp="1"/>
+          </p:cNvSpPr>
+          <p:nvPr>
+            <p:ph type="title"/>
+          </p:nvPr>
+        </p:nvSpPr>
+        <p:spPr/>
+        <p:txBody>
+          <a:bodyPr/>
+          <a:lstStyle/>
+          <a:p>
+            <a:r>
+              <a:rPr lang="en-US" dirty="0" smtClean="0"/>
+              <a:t>Sorting Comments by Vote</a:t>
+            </a:r>
+            <a:endParaRPr lang="en-US" dirty="0"/>
+          </a:p>
+        </p:txBody>
+      </p:sp>
+    </p:spTree>
+    <p:extLst>
+      <p:ext uri="{BB962C8B-B14F-4D97-AF65-F5344CB8AC3E}">
+        <p14:creationId xmlns:p14="http://schemas.microsoft.com/office/powerpoint/2010/main" val="2388612909"/>
+      </p:ext>
+    </p:extLst>
+  </p:cSld>
+  <p:clrMapOvr>
+    <a:masterClrMapping/>
+  </p:clrMapOvr>
+  <p:timing>
+    <p:tnLst>
+      <p:par>
+        <p:cTn id="1" dur="indefinite" restart="never" nodeType="tmRoot"/>
+      </p:par>
+    </p:tnLst>
+  </p:timing>
+</p:sld>
+</file>
+
+<file path=ppt/slides/slide29.xml><?xml version="1.0" encoding="utf-8"?>
+<p:sld xmlns:a="http://schemas.openxmlformats.org/drawingml/2006/main" xmlns:r="http://schemas.openxmlformats.org/officeDocument/2006/relationships" xmlns:p="http://schemas.openxmlformats.org/presentationml/2006/main">
+  <p:cSld>
+    <p:spTree>
+      <p:nvGrpSpPr>
+        <p:cNvPr id="1" name=""/>
+        <p:cNvGrpSpPr/>
+        <p:nvPr/>
+      </p:nvGrpSpPr>
+      <p:grpSpPr>
+        <a:xfrm>
+          <a:off x="0" y="0"/>
+          <a:ext cx="0" cy="0"/>
+          <a:chOff x="0" y="0"/>
+          <a:chExt cx="0" cy="0"/>
+        </a:xfrm>
+      </p:grpSpPr>
+      <p:sp>
+        <p:nvSpPr>
+          <p:cNvPr id="2" name="Content Placeholder 1"/>
+          <p:cNvSpPr>
+            <a:spLocks noGrp="1"/>
+          </p:cNvSpPr>
+          <p:nvPr>
+            <p:ph idx="1"/>
+          </p:nvPr>
+        </p:nvSpPr>
+        <p:spPr/>
+        <p:txBody>
+          <a:bodyPr>
+            <a:normAutofit/>
+          </a:bodyPr>
+          <a:lstStyle/>
+          <a:p>
+            <a:r>
+              <a:rPr lang="en-US" dirty="0" smtClean="0"/>
+              <a:t>Searching!</a:t>
+            </a:r>
+          </a:p>
+          <a:p>
+            <a:r>
+              <a:rPr lang="en-US" dirty="0" smtClean="0"/>
+              <a:t>Just let </a:t>
+            </a:r>
+            <a:r>
+              <a:rPr lang="en-US" dirty="0" err="1" smtClean="0"/>
+              <a:t>google</a:t>
+            </a:r>
+            <a:r>
+              <a:rPr lang="en-US" dirty="0" smtClean="0"/>
+              <a:t> crawl our site!?  Well …</a:t>
+            </a:r>
+          </a:p>
+          <a:p>
+            <a:r>
+              <a:rPr lang="en-US" dirty="0" smtClean="0"/>
+              <a:t>C* does not have any mechanism for searching the contents of columns</a:t>
+            </a:r>
+          </a:p>
+          <a:p>
+            <a:r>
+              <a:rPr lang="en-US" dirty="0" smtClean="0"/>
+              <a:t>Pair C* with a search technology (</a:t>
+            </a:r>
+            <a:r>
+              <a:rPr lang="en-US" dirty="0" err="1" smtClean="0"/>
+              <a:t>Solr</a:t>
+            </a:r>
+            <a:r>
+              <a:rPr lang="en-US" dirty="0" smtClean="0"/>
+              <a:t>, Elastic Search, </a:t>
+            </a:r>
+            <a:r>
+              <a:rPr lang="en-US" dirty="0" err="1" smtClean="0"/>
+              <a:t>etc</a:t>
+            </a:r>
+            <a:r>
+              <a:rPr lang="en-US" dirty="0" smtClean="0"/>
+              <a:t>)</a:t>
+            </a:r>
+          </a:p>
+          <a:p>
+            <a:r>
+              <a:rPr lang="en-US" dirty="0" smtClean="0"/>
+              <a:t>Think about why C* should be chosen – HA, elasticity, speed, ease of administration, etc.</a:t>
+            </a:r>
+          </a:p>
+        </p:txBody>
+      </p:sp>
+      <p:sp>
+        <p:nvSpPr>
+          <p:cNvPr id="3" name="Title 2"/>
+          <p:cNvSpPr>
+            <a:spLocks noGrp="1"/>
+          </p:cNvSpPr>
+          <p:nvPr>
+            <p:ph type="title"/>
+          </p:nvPr>
+        </p:nvSpPr>
+        <p:spPr/>
+        <p:txBody>
+          <a:bodyPr/>
+          <a:lstStyle/>
+          <a:p>
+            <a:r>
+              <a:rPr lang="en-US" dirty="0" smtClean="0"/>
+              <a:t>What’s </a:t>
+            </a:r>
+            <a:r>
+              <a:rPr lang="en-US" dirty="0" err="1" smtClean="0"/>
+              <a:t>Bloggie</a:t>
+            </a:r>
+            <a:r>
+              <a:rPr lang="en-US" dirty="0" smtClean="0"/>
+              <a:t> Blog Missing?</a:t>
+            </a:r>
+            <a:endParaRPr lang="en-US" dirty="0"/>
+          </a:p>
+        </p:txBody>
+      </p:sp>
+    </p:spTree>
+    <p:extLst>
+      <p:ext uri="{BB962C8B-B14F-4D97-AF65-F5344CB8AC3E}">
+        <p14:creationId xmlns:p14="http://schemas.microsoft.com/office/powerpoint/2010/main" val="755665585"/>
+      </p:ext>
+    </p:extLst>
+  </p:cSld>
+  <p:clrMapOvr>
+    <a:masterClrMapping/>
+  </p:clrMapOvr>
+  <p:timing>
+    <p:tnLst>
+      <p:par>
+        <p:cTn id="1" dur="indefinite" restart="never" nodeType="tmRoot"/>
+      </p:par>
+    </p:tnLst>
+  </p:timing>
 </p:sld>
 </file>
 
@@ -18107,9 +18718,16 @@
             <p:ph idx="1"/>
           </p:nvPr>
         </p:nvSpPr>
-        <p:spPr/>
+        <p:spPr>
+          <a:xfrm>
+            <a:off x="872068" y="2675466"/>
+            <a:ext cx="7408333" cy="3725333"/>
+          </a:xfrm>
+        </p:spPr>
         <p:txBody>
-          <a:bodyPr/>
+          <a:bodyPr>
+            <a:normAutofit lnSpcReduction="10000"/>
+          </a:bodyPr>
           <a:lstStyle/>
           <a:p>
             <a:r>
@@ -18141,6 +18759,20 @@
             <a:r>
               <a:rPr lang="en-US" dirty="0" smtClean="0"/>
               <a:t>Index – a way to retrieve a sorted list of rows by a column’s value (not suitable for most needs because of performance)</a:t>
+            </a:r>
+          </a:p>
+          <a:p>
+            <a:r>
+              <a:rPr lang="en-US" dirty="0" smtClean="0"/>
+              <a:t>Counters – A way to count things, events, </a:t>
+            </a:r>
+            <a:r>
+              <a:rPr lang="en-US" dirty="0" err="1" smtClean="0"/>
+              <a:t>etc</a:t>
+            </a:r>
+            <a:r>
+              <a:rPr lang="en-US" dirty="0" smtClean="0"/>
+              <a:t> in a distributed environment</a:t>
             </a:r>
             <a:endParaRPr lang="en-US" dirty="0"/>
           </a:p>
@@ -18163,7 +18795,7 @@
           <a:p>
             <a:r>
               <a:rPr lang="en-US" dirty="0" smtClean="0"/>
-              <a:t>Cassandra Data Model</a:t>
+              <a:t>Cassandra Model</a:t>
             </a:r>
             <a:endParaRPr lang="en-US" dirty="0"/>
           </a:p>
@@ -18173,6 +18805,197 @@
     <p:extLst>
       <p:ext uri="{BB962C8B-B14F-4D97-AF65-F5344CB8AC3E}">
         <p14:creationId xmlns:p14="http://schemas.microsoft.com/office/powerpoint/2010/main" val="3290858756"/>
+      </p:ext>
+    </p:extLst>
+  </p:cSld>
+  <p:clrMapOvr>
+    <a:masterClrMapping/>
+  </p:clrMapOvr>
+  <p:timing>
+    <p:tnLst>
+      <p:par>
+        <p:cTn id="1" dur="indefinite" restart="never" nodeType="tmRoot"/>
+      </p:par>
+    </p:tnLst>
+  </p:timing>
+</p:sld>
+</file>
+
+<file path=ppt/slides/slide30.xml><?xml version="1.0" encoding="utf-8"?>
+<p:sld xmlns:a="http://schemas.openxmlformats.org/drawingml/2006/main" xmlns:r="http://schemas.openxmlformats.org/officeDocument/2006/relationships" xmlns:p="http://schemas.openxmlformats.org/presentationml/2006/main">
+  <p:cSld>
+    <p:spTree>
+      <p:nvGrpSpPr>
+        <p:cNvPr id="1" name=""/>
+        <p:cNvGrpSpPr/>
+        <p:nvPr/>
+      </p:nvGrpSpPr>
+      <p:grpSpPr>
+        <a:xfrm>
+          <a:off x="0" y="0"/>
+          <a:ext cx="0" cy="0"/>
+          <a:chOff x="0" y="0"/>
+          <a:chExt cx="0" cy="0"/>
+        </a:xfrm>
+      </p:grpSpPr>
+      <p:sp>
+        <p:nvSpPr>
+          <p:cNvPr id="2" name="Content Placeholder 1"/>
+          <p:cNvSpPr>
+            <a:spLocks noGrp="1"/>
+          </p:cNvSpPr>
+          <p:nvPr>
+            <p:ph idx="1"/>
+          </p:nvPr>
+        </p:nvSpPr>
+        <p:spPr/>
+        <p:txBody>
+          <a:bodyPr>
+            <a:normAutofit fontScale="92500" lnSpcReduction="20000"/>
+          </a:bodyPr>
+          <a:lstStyle/>
+          <a:p>
+            <a:pPr marL="0" indent="0">
+              <a:buNone/>
+            </a:pPr>
+            <a:r>
+              <a:rPr lang="en-US" dirty="0" smtClean="0">
+                <a:hlinkClick r:id="rId2"/>
+              </a:rPr>
+              <a:t>https</a:t>
+            </a:r>
+            <a:r>
+              <a:rPr lang="en-US" dirty="0">
+                <a:hlinkClick r:id="rId2"/>
+              </a:rPr>
+              <a:t>://</a:t>
+            </a:r>
+            <a:r>
+              <a:rPr lang="en-US" dirty="0" smtClean="0">
+                <a:hlinkClick r:id="rId2"/>
+              </a:rPr>
+              <a:t>github.disney.com/Data-Solutions/bloggie-blog</a:t>
+            </a:r>
+            <a:endParaRPr lang="en-US" dirty="0" smtClean="0"/>
+          </a:p>
+          <a:p>
+            <a:pPr marL="0" indent="0">
+              <a:buNone/>
+            </a:pPr>
+            <a:endParaRPr lang="en-US" dirty="0" smtClean="0">
+              <a:hlinkClick r:id="rId3"/>
+            </a:endParaRPr>
+          </a:p>
+          <a:p>
+            <a:pPr marL="0" indent="0">
+              <a:buNone/>
+            </a:pPr>
+            <a:r>
+              <a:rPr lang="en-US" dirty="0" smtClean="0">
+                <a:hlinkClick r:id="rId3"/>
+              </a:rPr>
+              <a:t>https</a:t>
+            </a:r>
+            <a:r>
+              <a:rPr lang="en-US" dirty="0">
+                <a:hlinkClick r:id="rId3"/>
+              </a:rPr>
+              <a:t>://</a:t>
+            </a:r>
+            <a:r>
+              <a:rPr lang="en-US" dirty="0" smtClean="0">
+                <a:hlinkClick r:id="rId3"/>
+              </a:rPr>
+              <a:t>github.disney.com/Data-Solutions/cassandra-time-series</a:t>
+            </a:r>
+            <a:endParaRPr lang="en-US" dirty="0" smtClean="0"/>
+          </a:p>
+          <a:p>
+            <a:pPr marL="0" indent="0">
+              <a:buNone/>
+            </a:pPr>
+            <a:endParaRPr lang="en-US" dirty="0" smtClean="0"/>
+          </a:p>
+          <a:p>
+            <a:pPr marL="0" indent="0">
+              <a:buNone/>
+            </a:pPr>
+            <a:r>
+              <a:rPr lang="en-US" dirty="0">
+                <a:hlinkClick r:id="rId4"/>
+              </a:rPr>
+              <a:t>http://</a:t>
+            </a:r>
+            <a:r>
+              <a:rPr lang="en-US" dirty="0" smtClean="0">
+                <a:hlinkClick r:id="rId4"/>
+              </a:rPr>
+              <a:t>www.datastax.com/download/clientdrivers</a:t>
+            </a:r>
+            <a:endParaRPr lang="en-US" dirty="0" smtClean="0"/>
+          </a:p>
+          <a:p>
+            <a:pPr marL="0" indent="0">
+              <a:buNone/>
+            </a:pPr>
+            <a:endParaRPr lang="en-US" dirty="0"/>
+          </a:p>
+          <a:p>
+            <a:pPr marL="0" indent="0">
+              <a:buNone/>
+            </a:pPr>
+            <a:r>
+              <a:rPr lang="en-US" dirty="0">
+                <a:hlinkClick r:id="rId5"/>
+              </a:rPr>
+              <a:t>http://www.datastax.com/documentation/cassandra/2.0/webhelp/index.html#cassandra/gettingStartedCassandraIntro.html#concept_ds_k2h_ths_jl</a:t>
+            </a:r>
+            <a:endParaRPr lang="en-US" dirty="0" smtClean="0"/>
+          </a:p>
+          <a:p>
+            <a:pPr marL="0" indent="0">
+              <a:buNone/>
+            </a:pPr>
+            <a:endParaRPr lang="en-US" dirty="0" smtClean="0"/>
+          </a:p>
+          <a:p>
+            <a:pPr marL="0" indent="0">
+              <a:buNone/>
+            </a:pPr>
+            <a:endParaRPr lang="en-US" dirty="0" smtClean="0"/>
+          </a:p>
+          <a:p>
+            <a:endParaRPr lang="en-US" dirty="0" smtClean="0"/>
+          </a:p>
+        </p:txBody>
+      </p:sp>
+      <p:sp>
+        <p:nvSpPr>
+          <p:cNvPr id="3" name="Title 2"/>
+          <p:cNvSpPr>
+            <a:spLocks noGrp="1"/>
+          </p:cNvSpPr>
+          <p:nvPr>
+            <p:ph type="title"/>
+          </p:nvPr>
+        </p:nvSpPr>
+        <p:spPr/>
+        <p:txBody>
+          <a:bodyPr/>
+          <a:lstStyle/>
+          <a:p>
+            <a:r>
+              <a:rPr lang="en-US" dirty="0" smtClean="0"/>
+              <a:t>References</a:t>
+            </a:r>
+            <a:endParaRPr lang="en-US" dirty="0"/>
+          </a:p>
+        </p:txBody>
+      </p:sp>
+    </p:spTree>
+    <p:extLst>
+      <p:ext uri="{BB962C8B-B14F-4D97-AF65-F5344CB8AC3E}">
+        <p14:creationId xmlns:p14="http://schemas.microsoft.com/office/powerpoint/2010/main" val="2606787160"/>
       </p:ext>
     </p:extLst>
   </p:cSld>
@@ -18329,7 +19152,7 @@
         </p:nvSpPr>
         <p:spPr>
           <a:xfrm>
-            <a:off x="838200" y="4114800"/>
+            <a:off x="838201" y="4114800"/>
             <a:ext cx="7429500" cy="2514600"/>
           </a:xfrm>
           <a:prstGeom prst="rect">
@@ -18466,8 +19289,8 @@
         </p:nvSpPr>
         <p:spPr>
           <a:xfrm>
-            <a:off x="1047750" y="5486400"/>
-            <a:ext cx="1047750" cy="369332"/>
+            <a:off x="1047750" y="5486401"/>
+            <a:ext cx="1047751" cy="369332"/>
           </a:xfrm>
           <a:prstGeom prst="rect">
             <a:avLst/>
@@ -18496,7 +19319,7 @@
         </p:nvSpPr>
         <p:spPr>
           <a:xfrm>
-            <a:off x="2324100" y="5361117"/>
+            <a:off x="2324100" y="5361118"/>
             <a:ext cx="563880" cy="619899"/>
           </a:xfrm>
           <a:prstGeom prst="roundRect">
@@ -18545,7 +19368,7 @@
         </p:nvSpPr>
         <p:spPr>
           <a:xfrm>
-            <a:off x="2247900" y="5257800"/>
+            <a:off x="2247900" y="5257801"/>
             <a:ext cx="5638800" cy="826532"/>
           </a:xfrm>
           <a:prstGeom prst="rect">
@@ -18597,7 +19420,7 @@
         </p:nvSpPr>
         <p:spPr>
           <a:xfrm>
-            <a:off x="5386730" y="5361117"/>
+            <a:off x="5386731" y="5361118"/>
             <a:ext cx="563880" cy="619899"/>
           </a:xfrm>
           <a:prstGeom prst="roundRect">
@@ -18650,7 +19473,7 @@
         </p:nvSpPr>
         <p:spPr>
           <a:xfrm>
-            <a:off x="2948940" y="5361117"/>
+            <a:off x="2948940" y="5361118"/>
             <a:ext cx="563880" cy="619899"/>
           </a:xfrm>
           <a:prstGeom prst="roundRect">
@@ -18699,7 +19522,7 @@
         </p:nvSpPr>
         <p:spPr>
           <a:xfrm>
-            <a:off x="3573780" y="5361117"/>
+            <a:off x="3573780" y="5361118"/>
             <a:ext cx="563880" cy="619899"/>
           </a:xfrm>
           <a:prstGeom prst="roundRect">
@@ -18748,7 +19571,7 @@
         </p:nvSpPr>
         <p:spPr>
           <a:xfrm>
-            <a:off x="4198620" y="5361117"/>
+            <a:off x="4198620" y="5361118"/>
             <a:ext cx="563880" cy="619899"/>
           </a:xfrm>
           <a:prstGeom prst="roundRect">
@@ -18797,7 +19620,7 @@
         </p:nvSpPr>
         <p:spPr>
           <a:xfrm>
-            <a:off x="6023458" y="5361117"/>
+            <a:off x="6023459" y="5361118"/>
             <a:ext cx="563880" cy="619899"/>
           </a:xfrm>
           <a:prstGeom prst="roundRect">
@@ -18850,7 +19673,7 @@
         </p:nvSpPr>
         <p:spPr>
           <a:xfrm>
-            <a:off x="6648298" y="5361117"/>
+            <a:off x="6648299" y="5361118"/>
             <a:ext cx="563880" cy="619899"/>
           </a:xfrm>
           <a:prstGeom prst="roundRect">
@@ -18903,7 +19726,7 @@
         </p:nvSpPr>
         <p:spPr>
           <a:xfrm>
-            <a:off x="7273138" y="5361117"/>
+            <a:off x="7273139" y="5361118"/>
             <a:ext cx="563880" cy="619899"/>
           </a:xfrm>
           <a:prstGeom prst="roundRect">
@@ -18988,7 +19811,7 @@
         </p:nvSpPr>
         <p:spPr>
           <a:xfrm>
-            <a:off x="381000" y="2286001"/>
+            <a:off x="381001" y="2286001"/>
             <a:ext cx="8458201" cy="1752600"/>
           </a:xfrm>
         </p:spPr>
@@ -19012,7 +19835,7 @@
           <a:p>
             <a:r>
               <a:rPr lang="en-US" dirty="0" smtClean="0"/>
-              <a:t>A Batch of writes across CFs for a single key is atomic (but not isolated</a:t>
+              <a:t>A Batch of writes across CFs for a single key is atomic and isolated (isolation as of 1.1)</a:t>
             </a:r>
             <a:endParaRPr lang="en-US" dirty="0"/>
           </a:p>
@@ -19097,7 +19920,15 @@
             </a:r>
             <a:r>
               <a:rPr lang="en-US" dirty="0" smtClean="0"/>
-              <a:t>time and gain some atomicity for mutates</a:t>
+              <a:t>time and gain some atomicity </a:t>
+            </a:r>
+            <a:r>
+              <a:rPr lang="en-US" dirty="0" smtClean="0"/>
+              <a:t>and isolation for </a:t>
+            </a:r>
+            <a:r>
+              <a:rPr lang="en-US" dirty="0" smtClean="0"/>
+              <a:t>mutates</a:t>
             </a:r>
             <a:endParaRPr lang="en-US" dirty="0"/>
           </a:p>
@@ -19224,7 +20055,7 @@
         <p:spPr/>
         <p:txBody>
           <a:bodyPr>
-            <a:normAutofit lnSpcReduction="10000"/>
+            <a:normAutofit fontScale="92500"/>
           </a:bodyPr>
           <a:lstStyle/>
           <a:p>
@@ -19236,8 +20067,21 @@
           <a:p>
             <a:r>
               <a:rPr lang="en-US" dirty="0"/>
-              <a:t>Each node is assigned a token range on the ring</a:t>
-            </a:r>
+              <a:t>Each node is assigned a token range on the </a:t>
+            </a:r>
+            <a:r>
+              <a:rPr lang="en-US" dirty="0" smtClean="0"/>
+              <a:t>ring (</a:t>
+            </a:r>
+            <a:r>
+              <a:rPr lang="en-US" dirty="0" err="1" smtClean="0"/>
+              <a:t>vnodes</a:t>
+            </a:r>
+            <a:r>
+              <a:rPr lang="en-US" dirty="0" smtClean="0"/>
+              <a:t> does change this)</a:t>
+            </a:r>
+            <a:endParaRPr lang="en-US" dirty="0"/>
           </a:p>
           <a:p>
             <a:r>
@@ -19363,16 +20207,29 @@
           <a:p>
             <a:r>
               <a:rPr lang="en-US" dirty="0"/>
-              <a:t>Location of replicas is determined by consistent hash ring and the “</a:t>
-            </a:r>
-            <a:r>
-              <a:rPr lang="en-US" dirty="0" err="1"/>
+              <a:t>Location of replicas is determined by </a:t>
+            </a:r>
+            <a:r>
+              <a:rPr lang="en-US" dirty="0" smtClean="0"/>
+              <a:t>“</a:t>
+            </a:r>
+            <a:r>
+              <a:rPr lang="en-US" dirty="0" err="1" smtClean="0"/>
               <a:t>partitioner</a:t>
             </a:r>
             <a:r>
-              <a:rPr lang="en-US" dirty="0"/>
-              <a:t>”</a:t>
-            </a:r>
+              <a:rPr lang="en-US" dirty="0" smtClean="0"/>
+              <a:t>” and placement strategy (defined per </a:t>
+            </a:r>
+            <a:r>
+              <a:rPr lang="en-US" dirty="0" err="1" smtClean="0"/>
+              <a:t>keyspace</a:t>
+            </a:r>
+            <a:r>
+              <a:rPr lang="en-US" dirty="0" smtClean="0"/>
+              <a:t>)</a:t>
+            </a:r>
+            <a:endParaRPr lang="en-US" dirty="0"/>
           </a:p>
           <a:p>
             <a:r>
@@ -20100,7 +20957,7 @@
         </p:nvSpPr>
         <p:spPr>
           <a:xfrm>
-            <a:off x="4459909" y="1450800"/>
+            <a:off x="4459910" y="1450800"/>
             <a:ext cx="1286999" cy="378000"/>
           </a:xfrm>
           <a:prstGeom prst="rect">
@@ -20176,6 +21033,197 @@
           </a:p>
         </p:txBody>
       </p:sp>
+      <p:sp>
+        <p:nvSpPr>
+          <p:cNvPr id="2" name="Rounded Rectangle 1"/>
+          <p:cNvSpPr/>
+          <p:nvPr/>
+        </p:nvSpPr>
+        <p:spPr>
+          <a:xfrm>
+            <a:off x="7924800" y="3200400"/>
+            <a:ext cx="914400" cy="571498"/>
+          </a:xfrm>
+          <a:prstGeom prst="roundRect">
+            <a:avLst/>
+          </a:prstGeom>
+        </p:spPr>
+        <p:style>
+          <a:lnRef idx="2">
+            <a:schemeClr val="accent1">
+              <a:shade val="50000"/>
+            </a:schemeClr>
+          </a:lnRef>
+          <a:fillRef idx="1001">
+            <a:schemeClr val="dk2"/>
+          </a:fillRef>
+          <a:effectRef idx="0">
+            <a:schemeClr val="accent1"/>
+          </a:effectRef>
+          <a:fontRef idx="minor">
+            <a:schemeClr val="lt1"/>
+          </a:fontRef>
+        </p:style>
+        <p:txBody>
+          <a:bodyPr rtlCol="0" anchor="ctr"/>
+          <a:lstStyle/>
+          <a:p>
+            <a:pPr algn="ctr"/>
+            <a:r>
+              <a:rPr lang="en-US" dirty="0" smtClean="0"/>
+              <a:t>Client</a:t>
+            </a:r>
+            <a:endParaRPr lang="en-US" dirty="0"/>
+          </a:p>
+        </p:txBody>
+      </p:sp>
+      <p:cxnSp>
+        <p:nvCxnSpPr>
+          <p:cNvPr id="27" name="Straight Arrow Connector 26"/>
+          <p:cNvCxnSpPr>
+            <a:stCxn id="2" idx="1"/>
+            <a:endCxn id="7" idx="6"/>
+          </p:cNvCxnSpPr>
+          <p:nvPr/>
+        </p:nvCxnSpPr>
+        <p:spPr>
+          <a:xfrm flipH="1">
+            <a:off x="7226509" y="3486149"/>
+            <a:ext cx="698291" cy="72811"/>
+          </a:xfrm>
+          <a:prstGeom prst="straightConnector1">
+            <a:avLst/>
+          </a:prstGeom>
+          <a:ln>
+            <a:tailEnd type="arrow"/>
+          </a:ln>
+        </p:spPr>
+        <p:style>
+          <a:lnRef idx="1">
+            <a:schemeClr val="accent1"/>
+          </a:lnRef>
+          <a:fillRef idx="0">
+            <a:schemeClr val="accent1"/>
+          </a:fillRef>
+          <a:effectRef idx="0">
+            <a:schemeClr val="accent1"/>
+          </a:effectRef>
+          <a:fontRef idx="minor">
+            <a:schemeClr val="tx1"/>
+          </a:fontRef>
+        </p:style>
+      </p:cxnSp>
+      <p:cxnSp>
+        <p:nvCxnSpPr>
+          <p:cNvPr id="35" name="Straight Arrow Connector 34"/>
+          <p:cNvCxnSpPr>
+            <a:stCxn id="7" idx="3"/>
+            <a:endCxn id="10" idx="7"/>
+          </p:cNvCxnSpPr>
+          <p:nvPr/>
+        </p:nvCxnSpPr>
+        <p:spPr>
+          <a:xfrm flipH="1">
+            <a:off x="3501954" y="3717804"/>
+            <a:ext cx="3334310" cy="1479789"/>
+          </a:xfrm>
+          <a:prstGeom prst="straightConnector1">
+            <a:avLst/>
+          </a:prstGeom>
+          <a:ln>
+            <a:prstDash val="dash"/>
+            <a:tailEnd type="arrow"/>
+          </a:ln>
+        </p:spPr>
+        <p:style>
+          <a:lnRef idx="1">
+            <a:schemeClr val="accent1"/>
+          </a:lnRef>
+          <a:fillRef idx="0">
+            <a:schemeClr val="accent1"/>
+          </a:fillRef>
+          <a:effectRef idx="0">
+            <a:schemeClr val="accent1"/>
+          </a:effectRef>
+          <a:fontRef idx="minor">
+            <a:schemeClr val="tx1"/>
+          </a:fontRef>
+        </p:style>
+      </p:cxnSp>
+      <p:cxnSp>
+        <p:nvCxnSpPr>
+          <p:cNvPr id="38" name="Straight Arrow Connector 37"/>
+          <p:cNvCxnSpPr>
+            <a:stCxn id="7" idx="3"/>
+            <a:endCxn id="11" idx="7"/>
+          </p:cNvCxnSpPr>
+          <p:nvPr/>
+        </p:nvCxnSpPr>
+        <p:spPr>
+          <a:xfrm flipH="1">
+            <a:off x="4416354" y="3717804"/>
+            <a:ext cx="2419910" cy="2378349"/>
+          </a:xfrm>
+          <a:prstGeom prst="straightConnector1">
+            <a:avLst/>
+          </a:prstGeom>
+          <a:ln>
+            <a:prstDash val="dash"/>
+            <a:tailEnd type="arrow"/>
+          </a:ln>
+        </p:spPr>
+        <p:style>
+          <a:lnRef idx="1">
+            <a:schemeClr val="accent1"/>
+          </a:lnRef>
+          <a:fillRef idx="0">
+            <a:schemeClr val="accent1"/>
+          </a:fillRef>
+          <a:effectRef idx="0">
+            <a:schemeClr val="accent1"/>
+          </a:effectRef>
+          <a:fontRef idx="minor">
+            <a:schemeClr val="tx1"/>
+          </a:fontRef>
+        </p:style>
+      </p:cxnSp>
+      <p:cxnSp>
+        <p:nvCxnSpPr>
+          <p:cNvPr id="39" name="Straight Arrow Connector 38"/>
+          <p:cNvCxnSpPr>
+            <a:stCxn id="7" idx="3"/>
+            <a:endCxn id="8" idx="0"/>
+          </p:cNvCxnSpPr>
+          <p:nvPr/>
+        </p:nvCxnSpPr>
+        <p:spPr>
+          <a:xfrm flipH="1">
+            <a:off x="5626309" y="3717804"/>
+            <a:ext cx="1209955" cy="2462316"/>
+          </a:xfrm>
+          <a:prstGeom prst="straightConnector1">
+            <a:avLst/>
+          </a:prstGeom>
+          <a:ln>
+            <a:prstDash val="dash"/>
+            <a:tailEnd type="arrow"/>
+          </a:ln>
+        </p:spPr>
+        <p:style>
+          <a:lnRef idx="1">
+            <a:schemeClr val="accent1"/>
+          </a:lnRef>
+          <a:fillRef idx="0">
+            <a:schemeClr val="accent1"/>
+          </a:fillRef>
+          <a:effectRef idx="0">
+            <a:schemeClr val="accent1"/>
+          </a:effectRef>
+          <a:fontRef idx="minor">
+            <a:schemeClr val="tx1"/>
+          </a:fontRef>
+        </p:style>
+      </p:cxnSp>
     </p:spTree>
     <p:extLst>
       <p:ext uri="{BB962C8B-B14F-4D97-AF65-F5344CB8AC3E}">

</xml_diff>